<commit_message>
finales update PP über abktuellen stand
</commit_message>
<xml_diff>
--- a/PocketCoachExcel-PDF/PowerPoints/PocketCoach_UpdatePP.pptx
+++ b/PocketCoachExcel-PDF/PowerPoints/PocketCoach_UpdatePP.pptx
@@ -210,7 +210,7 @@
           <a:p>
             <a:fld id="{876C7EC8-880A-DF4F-BED9-A1919BEA3339}" type="datetimeFigureOut">
               <a:rPr lang="de-DE" smtClean="0"/>
-              <a:t>07.11.20</a:t>
+              <a:t>08.11.20</a:t>
             </a:fld>
             <a:endParaRPr lang="de-DE"/>
           </a:p>
@@ -2333,7 +2333,7 @@
           <a:p>
             <a:fld id="{05398259-13D8-49B1-995A-833CACEE6A13}" type="datetimeFigureOut">
               <a:rPr lang="de-DE" smtClean="0"/>
-              <a:t>07.11.20</a:t>
+              <a:t>08.11.20</a:t>
             </a:fld>
             <a:endParaRPr lang="de-DE"/>
           </a:p>
@@ -2584,7 +2584,7 @@
           <a:p>
             <a:fld id="{05398259-13D8-49B1-995A-833CACEE6A13}" type="datetimeFigureOut">
               <a:rPr lang="de-DE" smtClean="0"/>
-              <a:t>07.11.20</a:t>
+              <a:t>08.11.20</a:t>
             </a:fld>
             <a:endParaRPr lang="de-DE"/>
           </a:p>
@@ -2898,7 +2898,7 @@
           <a:p>
             <a:fld id="{05398259-13D8-49B1-995A-833CACEE6A13}" type="datetimeFigureOut">
               <a:rPr lang="de-DE" smtClean="0"/>
-              <a:t>07.11.20</a:t>
+              <a:t>08.11.20</a:t>
             </a:fld>
             <a:endParaRPr lang="de-DE"/>
           </a:p>
@@ -3239,7 +3239,7 @@
           <a:p>
             <a:fld id="{05398259-13D8-49B1-995A-833CACEE6A13}" type="datetimeFigureOut">
               <a:rPr lang="de-DE" smtClean="0"/>
-              <a:t>07.11.20</a:t>
+              <a:t>08.11.20</a:t>
             </a:fld>
             <a:endParaRPr lang="de-DE"/>
           </a:p>
@@ -3553,7 +3553,7 @@
           <a:p>
             <a:fld id="{05398259-13D8-49B1-995A-833CACEE6A13}" type="datetimeFigureOut">
               <a:rPr lang="de-DE" smtClean="0"/>
-              <a:t>07.11.20</a:t>
+              <a:t>08.11.20</a:t>
             </a:fld>
             <a:endParaRPr lang="de-DE"/>
           </a:p>
@@ -3946,7 +3946,7 @@
           <a:p>
             <a:fld id="{05398259-13D8-49B1-995A-833CACEE6A13}" type="datetimeFigureOut">
               <a:rPr lang="de-DE" smtClean="0"/>
-              <a:t>07.11.20</a:t>
+              <a:t>08.11.20</a:t>
             </a:fld>
             <a:endParaRPr lang="de-DE"/>
           </a:p>
@@ -4116,7 +4116,7 @@
           <a:p>
             <a:fld id="{05398259-13D8-49B1-995A-833CACEE6A13}" type="datetimeFigureOut">
               <a:rPr lang="de-DE" smtClean="0"/>
-              <a:t>07.11.20</a:t>
+              <a:t>08.11.20</a:t>
             </a:fld>
             <a:endParaRPr lang="de-DE"/>
           </a:p>
@@ -4296,7 +4296,7 @@
           <a:p>
             <a:fld id="{05398259-13D8-49B1-995A-833CACEE6A13}" type="datetimeFigureOut">
               <a:rPr lang="de-DE" smtClean="0"/>
-              <a:t>07.11.20</a:t>
+              <a:t>08.11.20</a:t>
             </a:fld>
             <a:endParaRPr lang="de-DE"/>
           </a:p>
@@ -4472,7 +4472,7 @@
           <a:p>
             <a:fld id="{05398259-13D8-49B1-995A-833CACEE6A13}" type="datetimeFigureOut">
               <a:rPr lang="de-DE" smtClean="0"/>
-              <a:t>07.11.20</a:t>
+              <a:t>08.11.20</a:t>
             </a:fld>
             <a:endParaRPr lang="de-DE"/>
           </a:p>
@@ -4719,7 +4719,7 @@
           <a:p>
             <a:fld id="{05398259-13D8-49B1-995A-833CACEE6A13}" type="datetimeFigureOut">
               <a:rPr lang="de-DE" smtClean="0"/>
-              <a:t>07.11.20</a:t>
+              <a:t>08.11.20</a:t>
             </a:fld>
             <a:endParaRPr lang="de-DE"/>
           </a:p>
@@ -4951,7 +4951,7 @@
           <a:p>
             <a:fld id="{05398259-13D8-49B1-995A-833CACEE6A13}" type="datetimeFigureOut">
               <a:rPr lang="de-DE" smtClean="0"/>
-              <a:t>07.11.20</a:t>
+              <a:t>08.11.20</a:t>
             </a:fld>
             <a:endParaRPr lang="de-DE"/>
           </a:p>
@@ -5325,7 +5325,7 @@
           <a:p>
             <a:fld id="{05398259-13D8-49B1-995A-833CACEE6A13}" type="datetimeFigureOut">
               <a:rPr lang="de-DE" smtClean="0"/>
-              <a:t>07.11.20</a:t>
+              <a:t>08.11.20</a:t>
             </a:fld>
             <a:endParaRPr lang="de-DE"/>
           </a:p>
@@ -5448,7 +5448,7 @@
           <a:p>
             <a:fld id="{05398259-13D8-49B1-995A-833CACEE6A13}" type="datetimeFigureOut">
               <a:rPr lang="de-DE" smtClean="0"/>
-              <a:t>07.11.20</a:t>
+              <a:t>08.11.20</a:t>
             </a:fld>
             <a:endParaRPr lang="de-DE"/>
           </a:p>
@@ -5543,7 +5543,7 @@
           <a:p>
             <a:fld id="{05398259-13D8-49B1-995A-833CACEE6A13}" type="datetimeFigureOut">
               <a:rPr lang="de-DE" smtClean="0"/>
-              <a:t>07.11.20</a:t>
+              <a:t>08.11.20</a:t>
             </a:fld>
             <a:endParaRPr lang="de-DE"/>
           </a:p>
@@ -5798,7 +5798,7 @@
           <a:p>
             <a:fld id="{05398259-13D8-49B1-995A-833CACEE6A13}" type="datetimeFigureOut">
               <a:rPr lang="de-DE" smtClean="0"/>
-              <a:t>07.11.20</a:t>
+              <a:t>08.11.20</a:t>
             </a:fld>
             <a:endParaRPr lang="de-DE"/>
           </a:p>
@@ -6061,7 +6061,7 @@
           <a:p>
             <a:fld id="{05398259-13D8-49B1-995A-833CACEE6A13}" type="datetimeFigureOut">
               <a:rPr lang="de-DE" smtClean="0"/>
-              <a:t>07.11.20</a:t>
+              <a:t>08.11.20</a:t>
             </a:fld>
             <a:endParaRPr lang="de-DE"/>
           </a:p>
@@ -6804,7 +6804,7 @@
           <a:p>
             <a:fld id="{05398259-13D8-49B1-995A-833CACEE6A13}" type="datetimeFigureOut">
               <a:rPr lang="de-DE" smtClean="0"/>
-              <a:t>07.11.20</a:t>
+              <a:t>08.11.20</a:t>
             </a:fld>
             <a:endParaRPr lang="de-DE"/>
           </a:p>
@@ -8583,6 +8583,12 @@
             <a:r>
               <a:rPr lang="de-DE" dirty="0"/>
               <a:t>Projektplan steht fest</a:t>
+            </a:r>
+          </a:p>
+          <a:p>
+            <a:r>
+              <a:rPr lang="de-DE" dirty="0"/>
+              <a:t>Befragung der Nutzenden erfolgreich</a:t>
             </a:r>
           </a:p>
         </p:txBody>
@@ -12548,6 +12554,18 @@
             <a:normAutofit/>
           </a:bodyPr>
           <a:lstStyle/>
+          <a:p>
+            <a:r>
+              <a:rPr lang="de-DE" dirty="0"/>
+              <a:t>Gruppenorganisation abgeschlossen</a:t>
+            </a:r>
+          </a:p>
+          <a:p>
+            <a:r>
+              <a:rPr lang="de-DE" dirty="0"/>
+              <a:t>Befragung der Fitnessstudiobesucher*innen durchgeführt </a:t>
+            </a:r>
+          </a:p>
           <a:p>
             <a:r>
               <a:rPr lang="de-DE" dirty="0"/>

</xml_diff>

<commit_message>
warum zum fick muss ich immer alles zwei mal commiten
</commit_message>
<xml_diff>
--- a/PocketCoachExcel-PDF/PowerPoints/PocketCoach_UpdatePP.pptx
+++ b/PocketCoachExcel-PDF/PowerPoints/PocketCoach_UpdatePP.pptx
@@ -5,23 +5,24 @@
     <p:sldMasterId id="2147483660" r:id="rId1"/>
   </p:sldMasterIdLst>
   <p:notesMasterIdLst>
-    <p:notesMasterId r:id="rId16"/>
+    <p:notesMasterId r:id="rId17"/>
   </p:notesMasterIdLst>
   <p:sldIdLst>
     <p:sldId id="256" r:id="rId2"/>
     <p:sldId id="257" r:id="rId3"/>
-    <p:sldId id="268" r:id="rId4"/>
-    <p:sldId id="269" r:id="rId5"/>
-    <p:sldId id="264" r:id="rId6"/>
-    <p:sldId id="271" r:id="rId7"/>
-    <p:sldId id="265" r:id="rId8"/>
-    <p:sldId id="258" r:id="rId9"/>
-    <p:sldId id="267" r:id="rId10"/>
-    <p:sldId id="263" r:id="rId11"/>
-    <p:sldId id="260" r:id="rId12"/>
-    <p:sldId id="273" r:id="rId13"/>
-    <p:sldId id="261" r:id="rId14"/>
-    <p:sldId id="262" r:id="rId15"/>
+    <p:sldId id="274" r:id="rId4"/>
+    <p:sldId id="268" r:id="rId5"/>
+    <p:sldId id="269" r:id="rId6"/>
+    <p:sldId id="264" r:id="rId7"/>
+    <p:sldId id="271" r:id="rId8"/>
+    <p:sldId id="265" r:id="rId9"/>
+    <p:sldId id="258" r:id="rId10"/>
+    <p:sldId id="267" r:id="rId11"/>
+    <p:sldId id="263" r:id="rId12"/>
+    <p:sldId id="260" r:id="rId13"/>
+    <p:sldId id="273" r:id="rId14"/>
+    <p:sldId id="261" r:id="rId15"/>
+    <p:sldId id="262" r:id="rId16"/>
   </p:sldIdLst>
   <p:sldSz cx="12192000" cy="6858000"/>
   <p:notesSz cx="6858000" cy="9144000"/>
@@ -590,7 +591,7 @@
           <a:p>
             <a:fld id="{7023F634-3B75-3C42-9B21-44E0DAFB93BE}" type="slidenum">
               <a:rPr lang="de-DE" smtClean="0"/>
-              <a:t>3</a:t>
+              <a:t>4</a:t>
             </a:fld>
             <a:endParaRPr lang="de-DE"/>
           </a:p>
@@ -722,7 +723,7 @@
           <a:p>
             <a:fld id="{7023F634-3B75-3C42-9B21-44E0DAFB93BE}" type="slidenum">
               <a:rPr lang="de-DE" smtClean="0"/>
-              <a:t>4</a:t>
+              <a:t>5</a:t>
             </a:fld>
             <a:endParaRPr lang="de-DE"/>
           </a:p>
@@ -855,7 +856,7 @@
           <a:p>
             <a:fld id="{7023F634-3B75-3C42-9B21-44E0DAFB93BE}" type="slidenum">
               <a:rPr lang="de-DE" smtClean="0"/>
-              <a:t>5</a:t>
+              <a:t>6</a:t>
             </a:fld>
             <a:endParaRPr lang="de-DE"/>
           </a:p>
@@ -988,7 +989,7 @@
           <a:p>
             <a:fld id="{7023F634-3B75-3C42-9B21-44E0DAFB93BE}" type="slidenum">
               <a:rPr lang="de-DE" smtClean="0"/>
-              <a:t>6</a:t>
+              <a:t>7</a:t>
             </a:fld>
             <a:endParaRPr lang="de-DE"/>
           </a:p>
@@ -1133,7 +1134,7 @@
           <a:p>
             <a:fld id="{7023F634-3B75-3C42-9B21-44E0DAFB93BE}" type="slidenum">
               <a:rPr lang="de-DE" smtClean="0"/>
-              <a:t>7</a:t>
+              <a:t>8</a:t>
             </a:fld>
             <a:endParaRPr lang="de-DE"/>
           </a:p>
@@ -1255,7 +1256,7 @@
           <a:p>
             <a:fld id="{7023F634-3B75-3C42-9B21-44E0DAFB93BE}" type="slidenum">
               <a:rPr lang="de-DE" smtClean="0"/>
-              <a:t>8</a:t>
+              <a:t>9</a:t>
             </a:fld>
             <a:endParaRPr lang="de-DE"/>
           </a:p>
@@ -1377,7 +1378,7 @@
           <a:p>
             <a:fld id="{7023F634-3B75-3C42-9B21-44E0DAFB93BE}" type="slidenum">
               <a:rPr lang="de-DE" smtClean="0"/>
-              <a:t>9</a:t>
+              <a:t>10</a:t>
             </a:fld>
             <a:endParaRPr lang="de-DE"/>
           </a:p>
@@ -1508,7 +1509,7 @@
           <a:p>
             <a:fld id="{7023F634-3B75-3C42-9B21-44E0DAFB93BE}" type="slidenum">
               <a:rPr lang="de-DE" smtClean="0"/>
-              <a:t>10</a:t>
+              <a:t>11</a:t>
             </a:fld>
             <a:endParaRPr lang="de-DE"/>
           </a:p>
@@ -1592,7 +1593,7 @@
           <a:p>
             <a:fld id="{7023F634-3B75-3C42-9B21-44E0DAFB93BE}" type="slidenum">
               <a:rPr lang="de-DE" smtClean="0"/>
-              <a:t>12</a:t>
+              <a:t>13</a:t>
             </a:fld>
             <a:endParaRPr lang="de-DE"/>
           </a:p>
@@ -7591,6 +7592,854 @@
           </a:prstGeom>
         </p:spPr>
       </p:pic>
+      <p:grpSp>
+        <p:nvGrpSpPr>
+          <p:cNvPr id="6" name="Gruppieren 5">
+            <a:extLst>
+              <a:ext uri="{FF2B5EF4-FFF2-40B4-BE49-F238E27FC236}">
+                <a16:creationId xmlns:a16="http://schemas.microsoft.com/office/drawing/2014/main" id="{5D4BD2A1-56DD-6E4D-8A2A-A7F0B9A068FA}"/>
+              </a:ext>
+            </a:extLst>
+          </p:cNvPr>
+          <p:cNvGrpSpPr/>
+          <p:nvPr/>
+        </p:nvGrpSpPr>
+        <p:grpSpPr>
+          <a:xfrm>
+            <a:off x="455821" y="1688662"/>
+            <a:ext cx="8818181" cy="4660756"/>
+            <a:chOff x="0" y="306888"/>
+            <a:chExt cx="12192001" cy="6244224"/>
+          </a:xfrm>
+        </p:grpSpPr>
+        <p:pic>
+          <p:nvPicPr>
+            <p:cNvPr id="7" name="Grafik 6" descr="Smartphone">
+              <a:extLst>
+                <a:ext uri="{FF2B5EF4-FFF2-40B4-BE49-F238E27FC236}">
+                  <a16:creationId xmlns:a16="http://schemas.microsoft.com/office/drawing/2014/main" id="{CF40A642-1805-8B40-9844-61EB29381709}"/>
+                </a:ext>
+              </a:extLst>
+            </p:cNvPr>
+            <p:cNvPicPr>
+              <a:picLocks noChangeAspect="1"/>
+            </p:cNvPicPr>
+            <p:nvPr/>
+          </p:nvPicPr>
+          <p:blipFill rotWithShape="1">
+            <a:blip r:embed="rId5">
+              <a:extLst>
+                <a:ext uri="{96DAC541-7B7A-43D3-8B79-37D633B846F1}">
+                  <asvg:svgBlip xmlns:asvg="http://schemas.microsoft.com/office/drawing/2016/SVG/main" r:embed="rId6"/>
+                </a:ext>
+              </a:extLst>
+            </a:blip>
+            <a:srcRect t="4152" r="19668" b="4060"/>
+            <a:stretch/>
+          </p:blipFill>
+          <p:spPr>
+            <a:xfrm>
+              <a:off x="6732615" y="313151"/>
+              <a:ext cx="5459386" cy="6237961"/>
+            </a:xfrm>
+            <a:prstGeom prst="rect">
+              <a:avLst/>
+            </a:prstGeom>
+          </p:spPr>
+        </p:pic>
+        <p:pic>
+          <p:nvPicPr>
+            <p:cNvPr id="8" name="Grafik 7" descr="Smartphone">
+              <a:extLst>
+                <a:ext uri="{FF2B5EF4-FFF2-40B4-BE49-F238E27FC236}">
+                  <a16:creationId xmlns:a16="http://schemas.microsoft.com/office/drawing/2014/main" id="{02979F11-0FDE-0B44-9A43-B2F333FE238A}"/>
+                </a:ext>
+              </a:extLst>
+            </p:cNvPr>
+            <p:cNvPicPr>
+              <a:picLocks noChangeAspect="1"/>
+            </p:cNvPicPr>
+            <p:nvPr/>
+          </p:nvPicPr>
+          <p:blipFill rotWithShape="1">
+            <a:blip r:embed="rId5">
+              <a:extLst>
+                <a:ext uri="{96DAC541-7B7A-43D3-8B79-37D633B846F1}">
+                  <asvg:svgBlip xmlns:asvg="http://schemas.microsoft.com/office/drawing/2016/SVG/main" r:embed="rId6"/>
+                </a:ext>
+              </a:extLst>
+            </a:blip>
+            <a:srcRect t="4060" b="4152"/>
+            <a:stretch/>
+          </p:blipFill>
+          <p:spPr>
+            <a:xfrm>
+              <a:off x="2697957" y="306888"/>
+              <a:ext cx="6796085" cy="6237961"/>
+            </a:xfrm>
+            <a:prstGeom prst="rect">
+              <a:avLst/>
+            </a:prstGeom>
+          </p:spPr>
+        </p:pic>
+        <p:pic>
+          <p:nvPicPr>
+            <p:cNvPr id="9" name="Grafik 8" descr="Smartphone">
+              <a:extLst>
+                <a:ext uri="{FF2B5EF4-FFF2-40B4-BE49-F238E27FC236}">
+                  <a16:creationId xmlns:a16="http://schemas.microsoft.com/office/drawing/2014/main" id="{69990857-5937-8C46-9611-E306A64535EA}"/>
+                </a:ext>
+              </a:extLst>
+            </p:cNvPr>
+            <p:cNvPicPr>
+              <a:picLocks noChangeAspect="1"/>
+            </p:cNvPicPr>
+            <p:nvPr/>
+          </p:nvPicPr>
+          <p:blipFill rotWithShape="1">
+            <a:blip r:embed="rId5">
+              <a:extLst>
+                <a:ext uri="{96DAC541-7B7A-43D3-8B79-37D633B846F1}">
+                  <asvg:svgBlip xmlns:asvg="http://schemas.microsoft.com/office/drawing/2016/SVG/main" r:embed="rId6"/>
+                </a:ext>
+              </a:extLst>
+            </a:blip>
+            <a:srcRect l="19622" t="4607" b="3605"/>
+            <a:stretch/>
+          </p:blipFill>
+          <p:spPr>
+            <a:xfrm>
+              <a:off x="0" y="313151"/>
+              <a:ext cx="5462589" cy="6237961"/>
+            </a:xfrm>
+            <a:prstGeom prst="rect">
+              <a:avLst/>
+            </a:prstGeom>
+          </p:spPr>
+        </p:pic>
+        <p:grpSp>
+          <p:nvGrpSpPr>
+            <p:cNvPr id="10" name="Gruppieren 9">
+              <a:extLst>
+                <a:ext uri="{FF2B5EF4-FFF2-40B4-BE49-F238E27FC236}">
+                  <a16:creationId xmlns:a16="http://schemas.microsoft.com/office/drawing/2014/main" id="{E3BA2661-9732-5E41-844C-87F3AA3425CB}"/>
+                </a:ext>
+              </a:extLst>
+            </p:cNvPr>
+            <p:cNvGrpSpPr/>
+            <p:nvPr/>
+          </p:nvGrpSpPr>
+          <p:grpSpPr>
+            <a:xfrm>
+              <a:off x="882443" y="2306206"/>
+              <a:ext cx="2364206" cy="2139272"/>
+              <a:chOff x="1119973" y="1429332"/>
+              <a:chExt cx="2940802" cy="3024858"/>
+            </a:xfrm>
+          </p:grpSpPr>
+          <p:sp>
+            <p:nvSpPr>
+              <p:cNvPr id="18" name="Abgerundetes Rechteck 17">
+                <a:extLst>
+                  <a:ext uri="{FF2B5EF4-FFF2-40B4-BE49-F238E27FC236}">
+                    <a16:creationId xmlns:a16="http://schemas.microsoft.com/office/drawing/2014/main" id="{E101281D-EBD7-7746-8AF3-9446A195CB3A}"/>
+                  </a:ext>
+                </a:extLst>
+              </p:cNvPr>
+              <p:cNvSpPr/>
+              <p:nvPr/>
+            </p:nvSpPr>
+            <p:spPr>
+              <a:xfrm>
+                <a:off x="1119973" y="1429332"/>
+                <a:ext cx="1381931" cy="1464391"/>
+              </a:xfrm>
+              <a:prstGeom prst="roundRect">
+                <a:avLst/>
+              </a:prstGeom>
+              <a:noFill/>
+              <a:ln w="76200">
+                <a:solidFill>
+                  <a:schemeClr val="tx1"/>
+                </a:solidFill>
+              </a:ln>
+            </p:spPr>
+            <p:style>
+              <a:lnRef idx="2">
+                <a:schemeClr val="accent6"/>
+              </a:lnRef>
+              <a:fillRef idx="1">
+                <a:schemeClr val="lt1"/>
+              </a:fillRef>
+              <a:effectRef idx="0">
+                <a:schemeClr val="accent6"/>
+              </a:effectRef>
+              <a:fontRef idx="minor">
+                <a:schemeClr val="dk1"/>
+              </a:fontRef>
+            </p:style>
+            <p:txBody>
+              <a:bodyPr rtlCol="0" anchor="ctr"/>
+              <a:lstStyle/>
+              <a:p>
+                <a:endParaRPr lang="de-DE"/>
+              </a:p>
+            </p:txBody>
+          </p:sp>
+          <p:sp>
+            <p:nvSpPr>
+              <p:cNvPr id="19" name="Abgerundetes Rechteck 18">
+                <a:extLst>
+                  <a:ext uri="{FF2B5EF4-FFF2-40B4-BE49-F238E27FC236}">
+                    <a16:creationId xmlns:a16="http://schemas.microsoft.com/office/drawing/2014/main" id="{8D08869D-676E-E448-BB29-41720F15C9A1}"/>
+                  </a:ext>
+                </a:extLst>
+              </p:cNvPr>
+              <p:cNvSpPr/>
+              <p:nvPr/>
+            </p:nvSpPr>
+            <p:spPr>
+              <a:xfrm>
+                <a:off x="2678844" y="1429332"/>
+                <a:ext cx="1381931" cy="1464391"/>
+              </a:xfrm>
+              <a:prstGeom prst="roundRect">
+                <a:avLst/>
+              </a:prstGeom>
+              <a:noFill/>
+              <a:ln w="76200">
+                <a:solidFill>
+                  <a:schemeClr val="tx1"/>
+                </a:solidFill>
+              </a:ln>
+            </p:spPr>
+            <p:style>
+              <a:lnRef idx="2">
+                <a:schemeClr val="accent6"/>
+              </a:lnRef>
+              <a:fillRef idx="1">
+                <a:schemeClr val="lt1"/>
+              </a:fillRef>
+              <a:effectRef idx="0">
+                <a:schemeClr val="accent6"/>
+              </a:effectRef>
+              <a:fontRef idx="minor">
+                <a:schemeClr val="dk1"/>
+              </a:fontRef>
+            </p:style>
+            <p:txBody>
+              <a:bodyPr rtlCol="0" anchor="ctr"/>
+              <a:lstStyle/>
+              <a:p>
+                <a:endParaRPr lang="de-DE"/>
+              </a:p>
+            </p:txBody>
+          </p:sp>
+          <p:sp>
+            <p:nvSpPr>
+              <p:cNvPr id="20" name="Abgerundetes Rechteck 19">
+                <a:extLst>
+                  <a:ext uri="{FF2B5EF4-FFF2-40B4-BE49-F238E27FC236}">
+                    <a16:creationId xmlns:a16="http://schemas.microsoft.com/office/drawing/2014/main" id="{F385159A-9674-854B-9CFF-2CE05AFAAB6D}"/>
+                  </a:ext>
+                </a:extLst>
+              </p:cNvPr>
+              <p:cNvSpPr/>
+              <p:nvPr/>
+            </p:nvSpPr>
+            <p:spPr>
+              <a:xfrm>
+                <a:off x="1119973" y="3052577"/>
+                <a:ext cx="1381931" cy="1401613"/>
+              </a:xfrm>
+              <a:prstGeom prst="roundRect">
+                <a:avLst/>
+              </a:prstGeom>
+              <a:noFill/>
+              <a:ln w="76200">
+                <a:solidFill>
+                  <a:schemeClr val="tx1"/>
+                </a:solidFill>
+              </a:ln>
+            </p:spPr>
+            <p:style>
+              <a:lnRef idx="2">
+                <a:schemeClr val="accent6"/>
+              </a:lnRef>
+              <a:fillRef idx="1">
+                <a:schemeClr val="lt1"/>
+              </a:fillRef>
+              <a:effectRef idx="0">
+                <a:schemeClr val="accent6"/>
+              </a:effectRef>
+              <a:fontRef idx="minor">
+                <a:schemeClr val="dk1"/>
+              </a:fontRef>
+            </p:style>
+            <p:txBody>
+              <a:bodyPr rtlCol="0" anchor="ctr"/>
+              <a:lstStyle/>
+              <a:p>
+                <a:endParaRPr lang="de-DE"/>
+              </a:p>
+            </p:txBody>
+          </p:sp>
+          <p:sp>
+            <p:nvSpPr>
+              <p:cNvPr id="21" name="Abgerundetes Rechteck 20">
+                <a:extLst>
+                  <a:ext uri="{FF2B5EF4-FFF2-40B4-BE49-F238E27FC236}">
+                    <a16:creationId xmlns:a16="http://schemas.microsoft.com/office/drawing/2014/main" id="{2759EA4E-4F89-E844-A111-8E4A78C5D56C}"/>
+                  </a:ext>
+                </a:extLst>
+              </p:cNvPr>
+              <p:cNvSpPr/>
+              <p:nvPr/>
+            </p:nvSpPr>
+            <p:spPr>
+              <a:xfrm>
+                <a:off x="2678844" y="3052577"/>
+                <a:ext cx="1381931" cy="1401613"/>
+              </a:xfrm>
+              <a:prstGeom prst="roundRect">
+                <a:avLst/>
+              </a:prstGeom>
+              <a:noFill/>
+              <a:ln w="76200">
+                <a:solidFill>
+                  <a:schemeClr val="tx1"/>
+                </a:solidFill>
+              </a:ln>
+            </p:spPr>
+            <p:style>
+              <a:lnRef idx="2">
+                <a:schemeClr val="accent6"/>
+              </a:lnRef>
+              <a:fillRef idx="1">
+                <a:schemeClr val="lt1"/>
+              </a:fillRef>
+              <a:effectRef idx="0">
+                <a:schemeClr val="accent6"/>
+              </a:effectRef>
+              <a:fontRef idx="minor">
+                <a:schemeClr val="dk1"/>
+              </a:fontRef>
+            </p:style>
+            <p:txBody>
+              <a:bodyPr rtlCol="0" anchor="ctr"/>
+              <a:lstStyle/>
+              <a:p>
+                <a:endParaRPr lang="de-DE" dirty="0"/>
+              </a:p>
+            </p:txBody>
+          </p:sp>
+          <p:pic>
+            <p:nvPicPr>
+              <p:cNvPr id="22" name="Grafik 21" descr="Muskulöser Arm">
+                <a:extLst>
+                  <a:ext uri="{FF2B5EF4-FFF2-40B4-BE49-F238E27FC236}">
+                    <a16:creationId xmlns:a16="http://schemas.microsoft.com/office/drawing/2014/main" id="{37481845-8549-624B-B525-705CC8380AB1}"/>
+                  </a:ext>
+                </a:extLst>
+              </p:cNvPr>
+              <p:cNvPicPr>
+                <a:picLocks noChangeAspect="1"/>
+              </p:cNvPicPr>
+              <p:nvPr/>
+            </p:nvPicPr>
+            <p:blipFill>
+              <a:blip r:embed="rId7">
+                <a:extLst>
+                  <a:ext uri="{96DAC541-7B7A-43D3-8B79-37D633B846F1}">
+                    <asvg:svgBlip xmlns:asvg="http://schemas.microsoft.com/office/drawing/2016/SVG/main" r:embed="rId8"/>
+                  </a:ext>
+                </a:extLst>
+              </a:blip>
+              <a:stretch>
+                <a:fillRect/>
+              </a:stretch>
+            </p:blipFill>
+            <p:spPr>
+              <a:xfrm>
+                <a:off x="2916509" y="1758667"/>
+                <a:ext cx="914400" cy="914400"/>
+              </a:xfrm>
+              <a:prstGeom prst="rect">
+                <a:avLst/>
+              </a:prstGeom>
+            </p:spPr>
+          </p:pic>
+          <p:pic>
+            <p:nvPicPr>
+              <p:cNvPr id="23" name="Grafik 22" descr="Bodybuilder">
+                <a:extLst>
+                  <a:ext uri="{FF2B5EF4-FFF2-40B4-BE49-F238E27FC236}">
+                    <a16:creationId xmlns:a16="http://schemas.microsoft.com/office/drawing/2014/main" id="{92816990-15E4-5C40-85BE-E22CB4DC39F0}"/>
+                  </a:ext>
+                </a:extLst>
+              </p:cNvPr>
+              <p:cNvPicPr>
+                <a:picLocks noChangeAspect="1"/>
+              </p:cNvPicPr>
+              <p:nvPr/>
+            </p:nvPicPr>
+            <p:blipFill>
+              <a:blip r:embed="rId9">
+                <a:extLst>
+                  <a:ext uri="{96DAC541-7B7A-43D3-8B79-37D633B846F1}">
+                    <asvg:svgBlip xmlns:asvg="http://schemas.microsoft.com/office/drawing/2016/SVG/main" r:embed="rId10"/>
+                  </a:ext>
+                </a:extLst>
+              </a:blip>
+              <a:stretch>
+                <a:fillRect/>
+              </a:stretch>
+            </p:blipFill>
+            <p:spPr>
+              <a:xfrm>
+                <a:off x="1353738" y="1785592"/>
+                <a:ext cx="914400" cy="914400"/>
+              </a:xfrm>
+              <a:prstGeom prst="rect">
+                <a:avLst/>
+              </a:prstGeom>
+            </p:spPr>
+          </p:pic>
+          <p:pic>
+            <p:nvPicPr>
+              <p:cNvPr id="24" name="Grafik 23" descr="Hürde">
+                <a:extLst>
+                  <a:ext uri="{FF2B5EF4-FFF2-40B4-BE49-F238E27FC236}">
+                    <a16:creationId xmlns:a16="http://schemas.microsoft.com/office/drawing/2014/main" id="{3000C8CF-A8A5-3B4B-97C6-06EE421C8227}"/>
+                  </a:ext>
+                </a:extLst>
+              </p:cNvPr>
+              <p:cNvPicPr>
+                <a:picLocks noChangeAspect="1"/>
+              </p:cNvPicPr>
+              <p:nvPr/>
+            </p:nvPicPr>
+            <p:blipFill>
+              <a:blip r:embed="rId11">
+                <a:extLst>
+                  <a:ext uri="{96DAC541-7B7A-43D3-8B79-37D633B846F1}">
+                    <asvg:svgBlip xmlns:asvg="http://schemas.microsoft.com/office/drawing/2016/SVG/main" r:embed="rId12"/>
+                  </a:ext>
+                </a:extLst>
+              </a:blip>
+              <a:stretch>
+                <a:fillRect/>
+              </a:stretch>
+            </p:blipFill>
+            <p:spPr>
+              <a:xfrm>
+                <a:off x="1353738" y="3226937"/>
+                <a:ext cx="914400" cy="914400"/>
+              </a:xfrm>
+              <a:prstGeom prst="rect">
+                <a:avLst/>
+              </a:prstGeom>
+            </p:spPr>
+          </p:pic>
+          <p:pic>
+            <p:nvPicPr>
+              <p:cNvPr id="25" name="Grafik 24" descr="Elliptisch">
+                <a:extLst>
+                  <a:ext uri="{FF2B5EF4-FFF2-40B4-BE49-F238E27FC236}">
+                    <a16:creationId xmlns:a16="http://schemas.microsoft.com/office/drawing/2014/main" id="{30DC96F1-E14A-594E-B289-FE6053B4C256}"/>
+                  </a:ext>
+                </a:extLst>
+              </p:cNvPr>
+              <p:cNvPicPr>
+                <a:picLocks noChangeAspect="1"/>
+              </p:cNvPicPr>
+              <p:nvPr/>
+            </p:nvPicPr>
+            <p:blipFill>
+              <a:blip r:embed="rId13">
+                <a:extLst>
+                  <a:ext uri="{96DAC541-7B7A-43D3-8B79-37D633B846F1}">
+                    <asvg:svgBlip xmlns:asvg="http://schemas.microsoft.com/office/drawing/2016/SVG/main" r:embed="rId14"/>
+                  </a:ext>
+                </a:extLst>
+              </a:blip>
+              <a:stretch>
+                <a:fillRect/>
+              </a:stretch>
+            </p:blipFill>
+            <p:spPr>
+              <a:xfrm>
+                <a:off x="2830726" y="3214535"/>
+                <a:ext cx="914400" cy="914400"/>
+              </a:xfrm>
+              <a:prstGeom prst="rect">
+                <a:avLst/>
+              </a:prstGeom>
+            </p:spPr>
+          </p:pic>
+        </p:grpSp>
+        <p:grpSp>
+          <p:nvGrpSpPr>
+            <p:cNvPr id="12" name="Gruppieren 11">
+              <a:extLst>
+                <a:ext uri="{FF2B5EF4-FFF2-40B4-BE49-F238E27FC236}">
+                  <a16:creationId xmlns:a16="http://schemas.microsoft.com/office/drawing/2014/main" id="{43D67448-20CE-5840-AC4E-D1766D4116DC}"/>
+                </a:ext>
+              </a:extLst>
+            </p:cNvPr>
+            <p:cNvGrpSpPr/>
+            <p:nvPr/>
+          </p:nvGrpSpPr>
+          <p:grpSpPr>
+            <a:xfrm>
+              <a:off x="4901652" y="2306525"/>
+              <a:ext cx="2376450" cy="2287932"/>
+              <a:chOff x="4711486" y="1296043"/>
+              <a:chExt cx="2933938" cy="3371626"/>
+            </a:xfrm>
+          </p:grpSpPr>
+          <p:sp>
+            <p:nvSpPr>
+              <p:cNvPr id="16" name="Abgerundetes Rechteck 15">
+                <a:extLst>
+                  <a:ext uri="{FF2B5EF4-FFF2-40B4-BE49-F238E27FC236}">
+                    <a16:creationId xmlns:a16="http://schemas.microsoft.com/office/drawing/2014/main" id="{3ADCE7F0-4FFC-1348-901E-8F4359A868A0}"/>
+                  </a:ext>
+                </a:extLst>
+              </p:cNvPr>
+              <p:cNvSpPr/>
+              <p:nvPr/>
+            </p:nvSpPr>
+            <p:spPr>
+              <a:xfrm>
+                <a:off x="4711486" y="1296043"/>
+                <a:ext cx="2933938" cy="3248833"/>
+              </a:xfrm>
+              <a:prstGeom prst="roundRect">
+                <a:avLst/>
+              </a:prstGeom>
+              <a:noFill/>
+              <a:ln w="76200">
+                <a:solidFill>
+                  <a:schemeClr val="tx1"/>
+                </a:solidFill>
+              </a:ln>
+            </p:spPr>
+            <p:style>
+              <a:lnRef idx="2">
+                <a:schemeClr val="accent6"/>
+              </a:lnRef>
+              <a:fillRef idx="1">
+                <a:schemeClr val="lt1"/>
+              </a:fillRef>
+              <a:effectRef idx="0">
+                <a:schemeClr val="accent6"/>
+              </a:effectRef>
+              <a:fontRef idx="minor">
+                <a:schemeClr val="dk1"/>
+              </a:fontRef>
+            </p:style>
+            <p:txBody>
+              <a:bodyPr rtlCol="0" anchor="ctr"/>
+              <a:lstStyle/>
+              <a:p>
+                <a:endParaRPr lang="de-DE"/>
+              </a:p>
+            </p:txBody>
+          </p:sp>
+          <p:pic>
+            <p:nvPicPr>
+              <p:cNvPr id="17" name="Grafik 16" descr="Änderungen &amp; Schneider">
+                <a:extLst>
+                  <a:ext uri="{FF2B5EF4-FFF2-40B4-BE49-F238E27FC236}">
+                    <a16:creationId xmlns:a16="http://schemas.microsoft.com/office/drawing/2014/main" id="{8BA2BE37-FDC6-0E44-9E97-14BE56340635}"/>
+                  </a:ext>
+                </a:extLst>
+              </p:cNvPr>
+              <p:cNvPicPr>
+                <a:picLocks noChangeAspect="1"/>
+              </p:cNvPicPr>
+              <p:nvPr/>
+            </p:nvPicPr>
+            <p:blipFill>
+              <a:blip r:embed="rId15">
+                <a:extLst>
+                  <a:ext uri="{96DAC541-7B7A-43D3-8B79-37D633B846F1}">
+                    <asvg:svgBlip xmlns:asvg="http://schemas.microsoft.com/office/drawing/2016/SVG/main" r:embed="rId16"/>
+                  </a:ext>
+                </a:extLst>
+              </a:blip>
+              <a:stretch>
+                <a:fillRect/>
+              </a:stretch>
+            </p:blipFill>
+            <p:spPr>
+              <a:xfrm>
+                <a:off x="5160161" y="2631081"/>
+                <a:ext cx="2036588" cy="2036588"/>
+              </a:xfrm>
+              <a:prstGeom prst="rect">
+                <a:avLst/>
+              </a:prstGeom>
+            </p:spPr>
+          </p:pic>
+        </p:grpSp>
+        <p:sp>
+          <p:nvSpPr>
+            <p:cNvPr id="13" name="Abgerundetes Rechteck 12">
+              <a:extLst>
+                <a:ext uri="{FF2B5EF4-FFF2-40B4-BE49-F238E27FC236}">
+                  <a16:creationId xmlns:a16="http://schemas.microsoft.com/office/drawing/2014/main" id="{0CC6499E-85D5-C44F-9E16-BD5B9097FCD7}"/>
+                </a:ext>
+              </a:extLst>
+            </p:cNvPr>
+            <p:cNvSpPr/>
+            <p:nvPr/>
+          </p:nvSpPr>
+          <p:spPr>
+            <a:xfrm>
+              <a:off x="8954503" y="2306524"/>
+              <a:ext cx="2376450" cy="2204607"/>
+            </a:xfrm>
+            <a:prstGeom prst="roundRect">
+              <a:avLst/>
+            </a:prstGeom>
+            <a:noFill/>
+            <a:ln w="76200">
+              <a:solidFill>
+                <a:schemeClr val="tx1"/>
+              </a:solidFill>
+            </a:ln>
+          </p:spPr>
+          <p:style>
+            <a:lnRef idx="2">
+              <a:schemeClr val="accent6"/>
+            </a:lnRef>
+            <a:fillRef idx="1">
+              <a:schemeClr val="lt1"/>
+            </a:fillRef>
+            <a:effectRef idx="0">
+              <a:schemeClr val="accent6"/>
+            </a:effectRef>
+            <a:fontRef idx="minor">
+              <a:schemeClr val="dk1"/>
+            </a:fontRef>
+          </p:style>
+          <p:txBody>
+            <a:bodyPr rtlCol="0" anchor="ctr"/>
+            <a:lstStyle/>
+            <a:p>
+              <a:endParaRPr lang="de-DE"/>
+            </a:p>
+          </p:txBody>
+        </p:sp>
+        <p:pic>
+          <p:nvPicPr>
+            <p:cNvPr id="14" name="Grafik 13" descr="Balkendiagramm">
+              <a:extLst>
+                <a:ext uri="{FF2B5EF4-FFF2-40B4-BE49-F238E27FC236}">
+                  <a16:creationId xmlns:a16="http://schemas.microsoft.com/office/drawing/2014/main" id="{888274BA-26D4-F449-9E91-7B0BF3260EF9}"/>
+                </a:ext>
+              </a:extLst>
+            </p:cNvPr>
+            <p:cNvPicPr>
+              <a:picLocks noChangeAspect="1"/>
+            </p:cNvPicPr>
+            <p:nvPr/>
+          </p:nvPicPr>
+          <p:blipFill>
+            <a:blip r:embed="rId17">
+              <a:extLst>
+                <a:ext uri="{96DAC541-7B7A-43D3-8B79-37D633B846F1}">
+                  <asvg:svgBlip xmlns:asvg="http://schemas.microsoft.com/office/drawing/2016/SVG/main" r:embed="rId18"/>
+                </a:ext>
+              </a:extLst>
+            </a:blip>
+            <a:stretch>
+              <a:fillRect/>
+            </a:stretch>
+          </p:blipFill>
+          <p:spPr>
+            <a:xfrm>
+              <a:off x="8894497" y="2195226"/>
+              <a:ext cx="2517976" cy="2517976"/>
+            </a:xfrm>
+            <a:prstGeom prst="rect">
+              <a:avLst/>
+            </a:prstGeom>
+          </p:spPr>
+        </p:pic>
+        <p:sp>
+          <p:nvSpPr>
+            <p:cNvPr id="15" name="Textfeld 14">
+              <a:extLst>
+                <a:ext uri="{FF2B5EF4-FFF2-40B4-BE49-F238E27FC236}">
+                  <a16:creationId xmlns:a16="http://schemas.microsoft.com/office/drawing/2014/main" id="{FD8337D0-6287-5940-887A-D2B9F12221AA}"/>
+                </a:ext>
+              </a:extLst>
+            </p:cNvPr>
+            <p:cNvSpPr txBox="1"/>
+            <p:nvPr/>
+          </p:nvSpPr>
+          <p:spPr>
+            <a:xfrm>
+              <a:off x="5373976" y="2547679"/>
+              <a:ext cx="1431802" cy="861774"/>
+            </a:xfrm>
+            <a:prstGeom prst="rect">
+              <a:avLst/>
+            </a:prstGeom>
+            <a:noFill/>
+          </p:spPr>
+          <p:txBody>
+            <a:bodyPr wrap="none" rtlCol="0">
+              <a:spAutoFit/>
+            </a:bodyPr>
+            <a:lstStyle/>
+            <a:p>
+              <a:r>
+                <a:rPr lang="de-DE" sz="5000" b="1" dirty="0"/>
+                <a:t>1RM</a:t>
+              </a:r>
+            </a:p>
+          </p:txBody>
+        </p:sp>
+      </p:grpSp>
+    </p:spTree>
+    <p:extLst>
+      <p:ext uri="{BB962C8B-B14F-4D97-AF65-F5344CB8AC3E}">
+        <p14:creationId xmlns:p14="http://schemas.microsoft.com/office/powerpoint/2010/main" val="1261335411"/>
+      </p:ext>
+    </p:extLst>
+  </p:cSld>
+  <p:clrMapOvr>
+    <a:masterClrMapping/>
+  </p:clrMapOvr>
+</p:sld>
+</file>
+
+<file path=ppt/slides/slide11.xml><?xml version="1.0" encoding="utf-8"?>
+<p:sld xmlns:a="http://schemas.openxmlformats.org/drawingml/2006/main" xmlns:r="http://schemas.openxmlformats.org/officeDocument/2006/relationships" xmlns:p="http://schemas.openxmlformats.org/presentationml/2006/main">
+  <p:cSld>
+    <p:spTree>
+      <p:nvGrpSpPr>
+        <p:cNvPr id="1" name=""/>
+        <p:cNvGrpSpPr/>
+        <p:nvPr/>
+      </p:nvGrpSpPr>
+      <p:grpSpPr>
+        <a:xfrm>
+          <a:off x="0" y="0"/>
+          <a:ext cx="0" cy="0"/>
+          <a:chOff x="0" y="0"/>
+          <a:chExt cx="0" cy="0"/>
+        </a:xfrm>
+      </p:grpSpPr>
+      <p:sp>
+        <p:nvSpPr>
+          <p:cNvPr id="2" name="Titel 1">
+            <a:extLst>
+              <a:ext uri="{FF2B5EF4-FFF2-40B4-BE49-F238E27FC236}">
+                <a16:creationId xmlns:a16="http://schemas.microsoft.com/office/drawing/2014/main" id="{0F09C5DB-EA82-4F84-A170-C8D7412D4EE0}"/>
+              </a:ext>
+            </a:extLst>
+          </p:cNvPr>
+          <p:cNvSpPr>
+            <a:spLocks noGrp="1"/>
+          </p:cNvSpPr>
+          <p:nvPr>
+            <p:ph type="title"/>
+          </p:nvPr>
+        </p:nvSpPr>
+        <p:spPr/>
+        <p:txBody>
+          <a:bodyPr>
+            <a:normAutofit/>
+          </a:bodyPr>
+          <a:lstStyle/>
+          <a:p>
+            <a:pPr algn="ctr"/>
+            <a:r>
+              <a:rPr lang="de-DE" dirty="0"/>
+              <a:t>Umsetzung der Projektidee</a:t>
+            </a:r>
+          </a:p>
+        </p:txBody>
+      </p:sp>
+      <p:pic>
+        <p:nvPicPr>
+          <p:cNvPr id="5" name="Grafik 4">
+            <a:extLst>
+              <a:ext uri="{FF2B5EF4-FFF2-40B4-BE49-F238E27FC236}">
+                <a16:creationId xmlns:a16="http://schemas.microsoft.com/office/drawing/2014/main" id="{7D260344-23DD-4348-A2A1-C8A2EF22687F}"/>
+              </a:ext>
+            </a:extLst>
+          </p:cNvPr>
+          <p:cNvPicPr>
+            <a:picLocks noChangeAspect="1"/>
+          </p:cNvPicPr>
+          <p:nvPr/>
+        </p:nvPicPr>
+        <p:blipFill rotWithShape="1">
+          <a:blip r:embed="rId3" cstate="print">
+            <a:extLst>
+              <a:ext uri="{28A0092B-C50C-407E-A947-70E740481C1C}">
+                <a14:useLocalDpi xmlns:a14="http://schemas.microsoft.com/office/drawing/2010/main" val="0"/>
+              </a:ext>
+            </a:extLst>
+          </a:blip>
+          <a:srcRect l="11774" t="14019" r="12142" b="11639"/>
+          <a:stretch/>
+        </p:blipFill>
+        <p:spPr bwMode="auto">
+          <a:xfrm>
+            <a:off x="10401302" y="104775"/>
+            <a:ext cx="1678020" cy="1440000"/>
+          </a:xfrm>
+          <a:prstGeom prst="rect">
+            <a:avLst/>
+          </a:prstGeom>
+          <a:noFill/>
+          <a:ln>
+            <a:noFill/>
+          </a:ln>
+        </p:spPr>
+      </p:pic>
+      <p:pic>
+        <p:nvPicPr>
+          <p:cNvPr id="11" name="Grafik 10">
+            <a:extLst>
+              <a:ext uri="{FF2B5EF4-FFF2-40B4-BE49-F238E27FC236}">
+                <a16:creationId xmlns:a16="http://schemas.microsoft.com/office/drawing/2014/main" id="{BDE6FB44-65FD-4E2B-BE99-975EFC3E58BC}"/>
+              </a:ext>
+            </a:extLst>
+          </p:cNvPr>
+          <p:cNvPicPr>
+            <a:picLocks noChangeAspect="1"/>
+          </p:cNvPicPr>
+          <p:nvPr/>
+        </p:nvPicPr>
+        <p:blipFill rotWithShape="1">
+          <a:blip r:embed="rId4">
+            <a:extLst>
+              <a:ext uri="{28A0092B-C50C-407E-A947-70E740481C1C}">
+                <a14:useLocalDpi xmlns:a14="http://schemas.microsoft.com/office/drawing/2010/main" val="0"/>
+              </a:ext>
+            </a:extLst>
+          </a:blip>
+          <a:srcRect l="6667" t="9360" r="47917" b="29306"/>
+          <a:stretch/>
+        </p:blipFill>
+        <p:spPr>
+          <a:xfrm>
+            <a:off x="112678" y="104775"/>
+            <a:ext cx="1421712" cy="1440000"/>
+          </a:xfrm>
+          <a:prstGeom prst="rect">
+            <a:avLst/>
+          </a:prstGeom>
+        </p:spPr>
+      </p:pic>
       <p:sp>
         <p:nvSpPr>
           <p:cNvPr id="6" name="Inhaltsplatzhalter 5">
@@ -7969,7 +8818,7 @@
 </p:sld>
 </file>
 
-<file path=ppt/slides/slide11.xml><?xml version="1.0" encoding="utf-8"?>
+<file path=ppt/slides/slide12.xml><?xml version="1.0" encoding="utf-8"?>
 <p:sld xmlns:a="http://schemas.openxmlformats.org/drawingml/2006/main" xmlns:r="http://schemas.openxmlformats.org/officeDocument/2006/relationships" xmlns:p="http://schemas.openxmlformats.org/presentationml/2006/main">
   <p:cSld>
     <p:spTree>
@@ -8168,7 +9017,7 @@
 </p:sld>
 </file>
 
-<file path=ppt/slides/slide12.xml><?xml version="1.0" encoding="utf-8"?>
+<file path=ppt/slides/slide13.xml><?xml version="1.0" encoding="utf-8"?>
 <p:sld xmlns:a="http://schemas.openxmlformats.org/drawingml/2006/main" xmlns:r="http://schemas.openxmlformats.org/officeDocument/2006/relationships" xmlns:p="http://schemas.openxmlformats.org/presentationml/2006/main">
   <p:cSld>
     <p:spTree>
@@ -8486,7 +9335,7 @@
 </p:sld>
 </file>
 
-<file path=ppt/slides/slide13.xml><?xml version="1.0" encoding="utf-8"?>
+<file path=ppt/slides/slide14.xml><?xml version="1.0" encoding="utf-8"?>
 <p:sld xmlns:a="http://schemas.openxmlformats.org/drawingml/2006/main" xmlns:r="http://schemas.openxmlformats.org/officeDocument/2006/relationships" xmlns:p="http://schemas.openxmlformats.org/presentationml/2006/main">
   <p:cSld>
     <p:spTree>
@@ -8978,7 +9827,7 @@
 </p:sld>
 </file>
 
-<file path=ppt/slides/slide14.xml><?xml version="1.0" encoding="utf-8"?>
+<file path=ppt/slides/slide15.xml><?xml version="1.0" encoding="utf-8"?>
 <p:sld xmlns:a="http://schemas.openxmlformats.org/drawingml/2006/main" xmlns:r="http://schemas.openxmlformats.org/officeDocument/2006/relationships" xmlns:p="http://schemas.openxmlformats.org/presentationml/2006/main">
   <p:cSld>
     <p:spTree>
@@ -9187,7 +10036,12 @@
             <p:ph idx="1"/>
           </p:nvPr>
         </p:nvSpPr>
-        <p:spPr/>
+        <p:spPr>
+          <a:xfrm>
+            <a:off x="4181601" y="2125172"/>
+            <a:ext cx="5002249" cy="3880773"/>
+          </a:xfrm>
+        </p:spPr>
         <p:txBody>
           <a:bodyPr>
             <a:normAutofit/>
@@ -9299,6 +10153,41 @@
           </a:prstGeom>
         </p:spPr>
       </p:pic>
+      <p:pic>
+        <p:nvPicPr>
+          <p:cNvPr id="6" name="Grafik 5" descr="Ein Bild, das Person, weiblich, darstellend enthält.&#10;&#10;Automatisch generierte Beschreibung">
+            <a:extLst>
+              <a:ext uri="{FF2B5EF4-FFF2-40B4-BE49-F238E27FC236}">
+                <a16:creationId xmlns:a16="http://schemas.microsoft.com/office/drawing/2014/main" id="{B5F31A20-2E7E-384A-8D9C-0636C1B7A32F}"/>
+              </a:ext>
+            </a:extLst>
+          </p:cNvPr>
+          <p:cNvPicPr>
+            <a:picLocks noChangeAspect="1"/>
+          </p:cNvPicPr>
+          <p:nvPr/>
+        </p:nvPicPr>
+        <p:blipFill rotWithShape="1">
+          <a:blip r:embed="rId4">
+            <a:extLst>
+              <a:ext uri="{28A0092B-C50C-407E-A947-70E740481C1C}">
+                <a14:useLocalDpi xmlns:a14="http://schemas.microsoft.com/office/drawing/2010/main" val="0"/>
+              </a:ext>
+            </a:extLst>
+          </a:blip>
+          <a:srcRect l="19762" r="14128"/>
+          <a:stretch/>
+        </p:blipFill>
+        <p:spPr>
+          <a:xfrm>
+            <a:off x="1125095" y="2125172"/>
+            <a:ext cx="2565529" cy="3880773"/>
+          </a:xfrm>
+          <a:prstGeom prst="rect">
+            <a:avLst/>
+          </a:prstGeom>
+        </p:spPr>
+      </p:pic>
     </p:spTree>
     <p:extLst>
       <p:ext uri="{BB962C8B-B14F-4D97-AF65-F5344CB8AC3E}">
@@ -9313,6 +10202,234 @@
 </file>
 
 <file path=ppt/slides/slide3.xml><?xml version="1.0" encoding="utf-8"?>
+<p:sld xmlns:a="http://schemas.openxmlformats.org/drawingml/2006/main" xmlns:r="http://schemas.openxmlformats.org/officeDocument/2006/relationships" xmlns:p="http://schemas.openxmlformats.org/presentationml/2006/main">
+  <p:cSld>
+    <p:spTree>
+      <p:nvGrpSpPr>
+        <p:cNvPr id="1" name=""/>
+        <p:cNvGrpSpPr/>
+        <p:nvPr/>
+      </p:nvGrpSpPr>
+      <p:grpSpPr>
+        <a:xfrm>
+          <a:off x="0" y="0"/>
+          <a:ext cx="0" cy="0"/>
+          <a:chOff x="0" y="0"/>
+          <a:chExt cx="0" cy="0"/>
+        </a:xfrm>
+      </p:grpSpPr>
+      <p:sp>
+        <p:nvSpPr>
+          <p:cNvPr id="2" name="Titel 1">
+            <a:extLst>
+              <a:ext uri="{FF2B5EF4-FFF2-40B4-BE49-F238E27FC236}">
+                <a16:creationId xmlns:a16="http://schemas.microsoft.com/office/drawing/2014/main" id="{0F09C5DB-EA82-4F84-A170-C8D7412D4EE0}"/>
+              </a:ext>
+            </a:extLst>
+          </p:cNvPr>
+          <p:cNvSpPr>
+            <a:spLocks noGrp="1"/>
+          </p:cNvSpPr>
+          <p:nvPr>
+            <p:ph type="title"/>
+          </p:nvPr>
+        </p:nvSpPr>
+        <p:spPr/>
+        <p:txBody>
+          <a:bodyPr/>
+          <a:lstStyle/>
+          <a:p>
+            <a:pPr algn="ctr"/>
+            <a:r>
+              <a:rPr lang="de-DE" dirty="0"/>
+              <a:t>Inhaltsverzeichnis</a:t>
+            </a:r>
+          </a:p>
+        </p:txBody>
+      </p:sp>
+      <p:sp>
+        <p:nvSpPr>
+          <p:cNvPr id="3" name="Inhaltsplatzhalter 2">
+            <a:extLst>
+              <a:ext uri="{FF2B5EF4-FFF2-40B4-BE49-F238E27FC236}">
+                <a16:creationId xmlns:a16="http://schemas.microsoft.com/office/drawing/2014/main" id="{FCDCEEBD-68DF-4924-8A41-91582416FA35}"/>
+              </a:ext>
+            </a:extLst>
+          </p:cNvPr>
+          <p:cNvSpPr>
+            <a:spLocks noGrp="1"/>
+          </p:cNvSpPr>
+          <p:nvPr>
+            <p:ph idx="1"/>
+          </p:nvPr>
+        </p:nvSpPr>
+        <p:spPr>
+          <a:xfrm>
+            <a:off x="1534390" y="1930400"/>
+            <a:ext cx="5002249" cy="3880773"/>
+          </a:xfrm>
+        </p:spPr>
+        <p:txBody>
+          <a:bodyPr>
+            <a:normAutofit/>
+          </a:bodyPr>
+          <a:lstStyle/>
+          <a:p>
+            <a:r>
+              <a:rPr lang="de-DE" sz="2400" dirty="0"/>
+              <a:t>Gantt-Diagramm</a:t>
+            </a:r>
+          </a:p>
+          <a:p>
+            <a:r>
+              <a:rPr lang="de-DE" sz="2400" dirty="0"/>
+              <a:t>Umsetzung der Projektidee</a:t>
+            </a:r>
+          </a:p>
+          <a:p>
+            <a:r>
+              <a:rPr lang="de-DE" sz="2400" dirty="0"/>
+              <a:t>Lastenheft</a:t>
+            </a:r>
+          </a:p>
+          <a:p>
+            <a:r>
+              <a:rPr lang="de-DE" sz="2400" dirty="0"/>
+              <a:t>Fazit</a:t>
+            </a:r>
+          </a:p>
+          <a:p>
+            <a:r>
+              <a:rPr lang="de-DE" sz="2400" dirty="0"/>
+              <a:t>Diskussion</a:t>
+            </a:r>
+          </a:p>
+        </p:txBody>
+      </p:sp>
+      <p:pic>
+        <p:nvPicPr>
+          <p:cNvPr id="5" name="Grafik 4">
+            <a:extLst>
+              <a:ext uri="{FF2B5EF4-FFF2-40B4-BE49-F238E27FC236}">
+                <a16:creationId xmlns:a16="http://schemas.microsoft.com/office/drawing/2014/main" id="{7D260344-23DD-4348-A2A1-C8A2EF22687F}"/>
+              </a:ext>
+            </a:extLst>
+          </p:cNvPr>
+          <p:cNvPicPr>
+            <a:picLocks noChangeAspect="1"/>
+          </p:cNvPicPr>
+          <p:nvPr/>
+        </p:nvPicPr>
+        <p:blipFill rotWithShape="1">
+          <a:blip r:embed="rId2" cstate="print">
+            <a:extLst>
+              <a:ext uri="{28A0092B-C50C-407E-A947-70E740481C1C}">
+                <a14:useLocalDpi xmlns:a14="http://schemas.microsoft.com/office/drawing/2010/main" val="0"/>
+              </a:ext>
+            </a:extLst>
+          </a:blip>
+          <a:srcRect l="11774" t="14019" r="12142" b="11639"/>
+          <a:stretch/>
+        </p:blipFill>
+        <p:spPr bwMode="auto">
+          <a:xfrm>
+            <a:off x="10401302" y="104775"/>
+            <a:ext cx="1678020" cy="1440000"/>
+          </a:xfrm>
+          <a:prstGeom prst="rect">
+            <a:avLst/>
+          </a:prstGeom>
+          <a:noFill/>
+          <a:ln>
+            <a:noFill/>
+          </a:ln>
+        </p:spPr>
+      </p:pic>
+      <p:pic>
+        <p:nvPicPr>
+          <p:cNvPr id="11" name="Grafik 10">
+            <a:extLst>
+              <a:ext uri="{FF2B5EF4-FFF2-40B4-BE49-F238E27FC236}">
+                <a16:creationId xmlns:a16="http://schemas.microsoft.com/office/drawing/2014/main" id="{BDE6FB44-65FD-4E2B-BE99-975EFC3E58BC}"/>
+              </a:ext>
+            </a:extLst>
+          </p:cNvPr>
+          <p:cNvPicPr>
+            <a:picLocks noChangeAspect="1"/>
+          </p:cNvPicPr>
+          <p:nvPr/>
+        </p:nvPicPr>
+        <p:blipFill rotWithShape="1">
+          <a:blip r:embed="rId3">
+            <a:extLst>
+              <a:ext uri="{28A0092B-C50C-407E-A947-70E740481C1C}">
+                <a14:useLocalDpi xmlns:a14="http://schemas.microsoft.com/office/drawing/2010/main" val="0"/>
+              </a:ext>
+            </a:extLst>
+          </a:blip>
+          <a:srcRect l="6667" t="9360" r="47917" b="29306"/>
+          <a:stretch/>
+        </p:blipFill>
+        <p:spPr>
+          <a:xfrm>
+            <a:off x="112678" y="104775"/>
+            <a:ext cx="1421712" cy="1440000"/>
+          </a:xfrm>
+          <a:prstGeom prst="rect">
+            <a:avLst/>
+          </a:prstGeom>
+        </p:spPr>
+      </p:pic>
+      <p:pic>
+        <p:nvPicPr>
+          <p:cNvPr id="8" name="Grafik 7" descr="Ein Bild, das Person, darstellend, weiblich enthält.&#10;&#10;Automatisch generierte Beschreibung">
+            <a:extLst>
+              <a:ext uri="{FF2B5EF4-FFF2-40B4-BE49-F238E27FC236}">
+                <a16:creationId xmlns:a16="http://schemas.microsoft.com/office/drawing/2014/main" id="{D886CEAC-2641-6F41-95CE-6661642D6C96}"/>
+              </a:ext>
+            </a:extLst>
+          </p:cNvPr>
+          <p:cNvPicPr>
+            <a:picLocks noChangeAspect="1"/>
+          </p:cNvPicPr>
+          <p:nvPr/>
+        </p:nvPicPr>
+        <p:blipFill>
+          <a:blip r:embed="rId4">
+            <a:extLst>
+              <a:ext uri="{28A0092B-C50C-407E-A947-70E740481C1C}">
+                <a14:useLocalDpi xmlns:a14="http://schemas.microsoft.com/office/drawing/2010/main" val="0"/>
+              </a:ext>
+            </a:extLst>
+          </a:blip>
+          <a:stretch>
+            <a:fillRect/>
+          </a:stretch>
+        </p:blipFill>
+        <p:spPr>
+          <a:xfrm flipH="1">
+            <a:off x="6536640" y="1696224"/>
+            <a:ext cx="2040506" cy="4145791"/>
+          </a:xfrm>
+          <a:prstGeom prst="rect">
+            <a:avLst/>
+          </a:prstGeom>
+        </p:spPr>
+      </p:pic>
+    </p:spTree>
+    <p:extLst>
+      <p:ext uri="{BB962C8B-B14F-4D97-AF65-F5344CB8AC3E}">
+        <p14:creationId xmlns:p14="http://schemas.microsoft.com/office/powerpoint/2010/main" val="2908359329"/>
+      </p:ext>
+    </p:extLst>
+  </p:cSld>
+  <p:clrMapOvr>
+    <a:masterClrMapping/>
+  </p:clrMapOvr>
+</p:sld>
+</file>
+
+<file path=ppt/slides/slide4.xml><?xml version="1.0" encoding="utf-8"?>
 <p:sld xmlns:a="http://schemas.openxmlformats.org/drawingml/2006/main" xmlns:r="http://schemas.openxmlformats.org/officeDocument/2006/relationships" xmlns:p="http://schemas.openxmlformats.org/presentationml/2006/main">
   <p:cSld>
     <p:spTree>
@@ -10005,7 +11122,7 @@
 </p:sld>
 </file>
 
-<file path=ppt/slides/slide4.xml><?xml version="1.0" encoding="utf-8"?>
+<file path=ppt/slides/slide5.xml><?xml version="1.0" encoding="utf-8"?>
 <p:sld xmlns:a="http://schemas.openxmlformats.org/drawingml/2006/main" xmlns:r="http://schemas.openxmlformats.org/officeDocument/2006/relationships" xmlns:p="http://schemas.openxmlformats.org/presentationml/2006/main">
   <p:cSld>
     <p:spTree>
@@ -10776,7 +11893,7 @@
 </p:sld>
 </file>
 
-<file path=ppt/slides/slide5.xml><?xml version="1.0" encoding="utf-8"?>
+<file path=ppt/slides/slide6.xml><?xml version="1.0" encoding="utf-8"?>
 <p:sld xmlns:a="http://schemas.openxmlformats.org/drawingml/2006/main" xmlns:r="http://schemas.openxmlformats.org/officeDocument/2006/relationships" xmlns:p="http://schemas.openxmlformats.org/presentationml/2006/main">
   <p:cSld>
     <p:spTree>
@@ -11486,7 +12603,7 @@
 </p:sld>
 </file>
 
-<file path=ppt/slides/slide6.xml><?xml version="1.0" encoding="utf-8"?>
+<file path=ppt/slides/slide7.xml><?xml version="1.0" encoding="utf-8"?>
 <p:sld xmlns:a="http://schemas.openxmlformats.org/drawingml/2006/main" xmlns:r="http://schemas.openxmlformats.org/officeDocument/2006/relationships" xmlns:p="http://schemas.openxmlformats.org/presentationml/2006/main">
   <p:cSld>
     <p:spTree>
@@ -12608,7 +13725,7 @@
 </p:sld>
 </file>
 
-<file path=ppt/slides/slide7.xml><?xml version="1.0" encoding="utf-8"?>
+<file path=ppt/slides/slide8.xml><?xml version="1.0" encoding="utf-8"?>
 <p:sld xmlns:a="http://schemas.openxmlformats.org/drawingml/2006/main" xmlns:r="http://schemas.openxmlformats.org/officeDocument/2006/relationships" xmlns:p="http://schemas.openxmlformats.org/presentationml/2006/main">
   <p:cSld>
     <p:spTree>
@@ -13221,7 +14338,7 @@
 </p:sld>
 </file>
 
-<file path=ppt/slides/slide8.xml><?xml version="1.0" encoding="utf-8"?>
+<file path=ppt/slides/slide9.xml><?xml version="1.0" encoding="utf-8"?>
 <p:sld xmlns:a="http://schemas.openxmlformats.org/drawingml/2006/main" xmlns:r="http://schemas.openxmlformats.org/officeDocument/2006/relationships" xmlns:p="http://schemas.openxmlformats.org/presentationml/2006/main">
   <p:cSld>
     <p:spTree>
@@ -14184,854 +15301,6 @@
 </p:sld>
 </file>
 
-<file path=ppt/slides/slide9.xml><?xml version="1.0" encoding="utf-8"?>
-<p:sld xmlns:a="http://schemas.openxmlformats.org/drawingml/2006/main" xmlns:r="http://schemas.openxmlformats.org/officeDocument/2006/relationships" xmlns:p="http://schemas.openxmlformats.org/presentationml/2006/main">
-  <p:cSld>
-    <p:spTree>
-      <p:nvGrpSpPr>
-        <p:cNvPr id="1" name=""/>
-        <p:cNvGrpSpPr/>
-        <p:nvPr/>
-      </p:nvGrpSpPr>
-      <p:grpSpPr>
-        <a:xfrm>
-          <a:off x="0" y="0"/>
-          <a:ext cx="0" cy="0"/>
-          <a:chOff x="0" y="0"/>
-          <a:chExt cx="0" cy="0"/>
-        </a:xfrm>
-      </p:grpSpPr>
-      <p:sp>
-        <p:nvSpPr>
-          <p:cNvPr id="2" name="Titel 1">
-            <a:extLst>
-              <a:ext uri="{FF2B5EF4-FFF2-40B4-BE49-F238E27FC236}">
-                <a16:creationId xmlns:a16="http://schemas.microsoft.com/office/drawing/2014/main" id="{0F09C5DB-EA82-4F84-A170-C8D7412D4EE0}"/>
-              </a:ext>
-            </a:extLst>
-          </p:cNvPr>
-          <p:cNvSpPr>
-            <a:spLocks noGrp="1"/>
-          </p:cNvSpPr>
-          <p:nvPr>
-            <p:ph type="title"/>
-          </p:nvPr>
-        </p:nvSpPr>
-        <p:spPr/>
-        <p:txBody>
-          <a:bodyPr>
-            <a:normAutofit/>
-          </a:bodyPr>
-          <a:lstStyle/>
-          <a:p>
-            <a:pPr algn="ctr"/>
-            <a:r>
-              <a:rPr lang="de-DE" dirty="0"/>
-              <a:t>Umsetzung der Projektidee</a:t>
-            </a:r>
-          </a:p>
-        </p:txBody>
-      </p:sp>
-      <p:pic>
-        <p:nvPicPr>
-          <p:cNvPr id="5" name="Grafik 4">
-            <a:extLst>
-              <a:ext uri="{FF2B5EF4-FFF2-40B4-BE49-F238E27FC236}">
-                <a16:creationId xmlns:a16="http://schemas.microsoft.com/office/drawing/2014/main" id="{7D260344-23DD-4348-A2A1-C8A2EF22687F}"/>
-              </a:ext>
-            </a:extLst>
-          </p:cNvPr>
-          <p:cNvPicPr>
-            <a:picLocks noChangeAspect="1"/>
-          </p:cNvPicPr>
-          <p:nvPr/>
-        </p:nvPicPr>
-        <p:blipFill rotWithShape="1">
-          <a:blip r:embed="rId3" cstate="print">
-            <a:extLst>
-              <a:ext uri="{28A0092B-C50C-407E-A947-70E740481C1C}">
-                <a14:useLocalDpi xmlns:a14="http://schemas.microsoft.com/office/drawing/2010/main" val="0"/>
-              </a:ext>
-            </a:extLst>
-          </a:blip>
-          <a:srcRect l="11774" t="14019" r="12142" b="11639"/>
-          <a:stretch/>
-        </p:blipFill>
-        <p:spPr bwMode="auto">
-          <a:xfrm>
-            <a:off x="10401302" y="104775"/>
-            <a:ext cx="1678020" cy="1440000"/>
-          </a:xfrm>
-          <a:prstGeom prst="rect">
-            <a:avLst/>
-          </a:prstGeom>
-          <a:noFill/>
-          <a:ln>
-            <a:noFill/>
-          </a:ln>
-        </p:spPr>
-      </p:pic>
-      <p:pic>
-        <p:nvPicPr>
-          <p:cNvPr id="11" name="Grafik 10">
-            <a:extLst>
-              <a:ext uri="{FF2B5EF4-FFF2-40B4-BE49-F238E27FC236}">
-                <a16:creationId xmlns:a16="http://schemas.microsoft.com/office/drawing/2014/main" id="{BDE6FB44-65FD-4E2B-BE99-975EFC3E58BC}"/>
-              </a:ext>
-            </a:extLst>
-          </p:cNvPr>
-          <p:cNvPicPr>
-            <a:picLocks noChangeAspect="1"/>
-          </p:cNvPicPr>
-          <p:nvPr/>
-        </p:nvPicPr>
-        <p:blipFill rotWithShape="1">
-          <a:blip r:embed="rId4">
-            <a:extLst>
-              <a:ext uri="{28A0092B-C50C-407E-A947-70E740481C1C}">
-                <a14:useLocalDpi xmlns:a14="http://schemas.microsoft.com/office/drawing/2010/main" val="0"/>
-              </a:ext>
-            </a:extLst>
-          </a:blip>
-          <a:srcRect l="6667" t="9360" r="47917" b="29306"/>
-          <a:stretch/>
-        </p:blipFill>
-        <p:spPr>
-          <a:xfrm>
-            <a:off x="112678" y="104775"/>
-            <a:ext cx="1421712" cy="1440000"/>
-          </a:xfrm>
-          <a:prstGeom prst="rect">
-            <a:avLst/>
-          </a:prstGeom>
-        </p:spPr>
-      </p:pic>
-      <p:grpSp>
-        <p:nvGrpSpPr>
-          <p:cNvPr id="6" name="Gruppieren 5">
-            <a:extLst>
-              <a:ext uri="{FF2B5EF4-FFF2-40B4-BE49-F238E27FC236}">
-                <a16:creationId xmlns:a16="http://schemas.microsoft.com/office/drawing/2014/main" id="{5D4BD2A1-56DD-6E4D-8A2A-A7F0B9A068FA}"/>
-              </a:ext>
-            </a:extLst>
-          </p:cNvPr>
-          <p:cNvGrpSpPr/>
-          <p:nvPr/>
-        </p:nvGrpSpPr>
-        <p:grpSpPr>
-          <a:xfrm>
-            <a:off x="455821" y="1688662"/>
-            <a:ext cx="8818181" cy="4660756"/>
-            <a:chOff x="0" y="306888"/>
-            <a:chExt cx="12192001" cy="6244224"/>
-          </a:xfrm>
-        </p:grpSpPr>
-        <p:pic>
-          <p:nvPicPr>
-            <p:cNvPr id="7" name="Grafik 6" descr="Smartphone">
-              <a:extLst>
-                <a:ext uri="{FF2B5EF4-FFF2-40B4-BE49-F238E27FC236}">
-                  <a16:creationId xmlns:a16="http://schemas.microsoft.com/office/drawing/2014/main" id="{CF40A642-1805-8B40-9844-61EB29381709}"/>
-                </a:ext>
-              </a:extLst>
-            </p:cNvPr>
-            <p:cNvPicPr>
-              <a:picLocks noChangeAspect="1"/>
-            </p:cNvPicPr>
-            <p:nvPr/>
-          </p:nvPicPr>
-          <p:blipFill rotWithShape="1">
-            <a:blip r:embed="rId5">
-              <a:extLst>
-                <a:ext uri="{96DAC541-7B7A-43D3-8B79-37D633B846F1}">
-                  <asvg:svgBlip xmlns:asvg="http://schemas.microsoft.com/office/drawing/2016/SVG/main" r:embed="rId6"/>
-                </a:ext>
-              </a:extLst>
-            </a:blip>
-            <a:srcRect t="4152" r="19668" b="4060"/>
-            <a:stretch/>
-          </p:blipFill>
-          <p:spPr>
-            <a:xfrm>
-              <a:off x="6732615" y="313151"/>
-              <a:ext cx="5459386" cy="6237961"/>
-            </a:xfrm>
-            <a:prstGeom prst="rect">
-              <a:avLst/>
-            </a:prstGeom>
-          </p:spPr>
-        </p:pic>
-        <p:pic>
-          <p:nvPicPr>
-            <p:cNvPr id="8" name="Grafik 7" descr="Smartphone">
-              <a:extLst>
-                <a:ext uri="{FF2B5EF4-FFF2-40B4-BE49-F238E27FC236}">
-                  <a16:creationId xmlns:a16="http://schemas.microsoft.com/office/drawing/2014/main" id="{02979F11-0FDE-0B44-9A43-B2F333FE238A}"/>
-                </a:ext>
-              </a:extLst>
-            </p:cNvPr>
-            <p:cNvPicPr>
-              <a:picLocks noChangeAspect="1"/>
-            </p:cNvPicPr>
-            <p:nvPr/>
-          </p:nvPicPr>
-          <p:blipFill rotWithShape="1">
-            <a:blip r:embed="rId5">
-              <a:extLst>
-                <a:ext uri="{96DAC541-7B7A-43D3-8B79-37D633B846F1}">
-                  <asvg:svgBlip xmlns:asvg="http://schemas.microsoft.com/office/drawing/2016/SVG/main" r:embed="rId6"/>
-                </a:ext>
-              </a:extLst>
-            </a:blip>
-            <a:srcRect t="4060" b="4152"/>
-            <a:stretch/>
-          </p:blipFill>
-          <p:spPr>
-            <a:xfrm>
-              <a:off x="2697957" y="306888"/>
-              <a:ext cx="6796085" cy="6237961"/>
-            </a:xfrm>
-            <a:prstGeom prst="rect">
-              <a:avLst/>
-            </a:prstGeom>
-          </p:spPr>
-        </p:pic>
-        <p:pic>
-          <p:nvPicPr>
-            <p:cNvPr id="9" name="Grafik 8" descr="Smartphone">
-              <a:extLst>
-                <a:ext uri="{FF2B5EF4-FFF2-40B4-BE49-F238E27FC236}">
-                  <a16:creationId xmlns:a16="http://schemas.microsoft.com/office/drawing/2014/main" id="{69990857-5937-8C46-9611-E306A64535EA}"/>
-                </a:ext>
-              </a:extLst>
-            </p:cNvPr>
-            <p:cNvPicPr>
-              <a:picLocks noChangeAspect="1"/>
-            </p:cNvPicPr>
-            <p:nvPr/>
-          </p:nvPicPr>
-          <p:blipFill rotWithShape="1">
-            <a:blip r:embed="rId5">
-              <a:extLst>
-                <a:ext uri="{96DAC541-7B7A-43D3-8B79-37D633B846F1}">
-                  <asvg:svgBlip xmlns:asvg="http://schemas.microsoft.com/office/drawing/2016/SVG/main" r:embed="rId6"/>
-                </a:ext>
-              </a:extLst>
-            </a:blip>
-            <a:srcRect l="19622" t="4607" b="3605"/>
-            <a:stretch/>
-          </p:blipFill>
-          <p:spPr>
-            <a:xfrm>
-              <a:off x="0" y="313151"/>
-              <a:ext cx="5462589" cy="6237961"/>
-            </a:xfrm>
-            <a:prstGeom prst="rect">
-              <a:avLst/>
-            </a:prstGeom>
-          </p:spPr>
-        </p:pic>
-        <p:grpSp>
-          <p:nvGrpSpPr>
-            <p:cNvPr id="10" name="Gruppieren 9">
-              <a:extLst>
-                <a:ext uri="{FF2B5EF4-FFF2-40B4-BE49-F238E27FC236}">
-                  <a16:creationId xmlns:a16="http://schemas.microsoft.com/office/drawing/2014/main" id="{E3BA2661-9732-5E41-844C-87F3AA3425CB}"/>
-                </a:ext>
-              </a:extLst>
-            </p:cNvPr>
-            <p:cNvGrpSpPr/>
-            <p:nvPr/>
-          </p:nvGrpSpPr>
-          <p:grpSpPr>
-            <a:xfrm>
-              <a:off x="882443" y="2306206"/>
-              <a:ext cx="2364206" cy="2139272"/>
-              <a:chOff x="1119973" y="1429332"/>
-              <a:chExt cx="2940802" cy="3024858"/>
-            </a:xfrm>
-          </p:grpSpPr>
-          <p:sp>
-            <p:nvSpPr>
-              <p:cNvPr id="18" name="Abgerundetes Rechteck 17">
-                <a:extLst>
-                  <a:ext uri="{FF2B5EF4-FFF2-40B4-BE49-F238E27FC236}">
-                    <a16:creationId xmlns:a16="http://schemas.microsoft.com/office/drawing/2014/main" id="{E101281D-EBD7-7746-8AF3-9446A195CB3A}"/>
-                  </a:ext>
-                </a:extLst>
-              </p:cNvPr>
-              <p:cNvSpPr/>
-              <p:nvPr/>
-            </p:nvSpPr>
-            <p:spPr>
-              <a:xfrm>
-                <a:off x="1119973" y="1429332"/>
-                <a:ext cx="1381931" cy="1464391"/>
-              </a:xfrm>
-              <a:prstGeom prst="roundRect">
-                <a:avLst/>
-              </a:prstGeom>
-              <a:noFill/>
-              <a:ln w="76200">
-                <a:solidFill>
-                  <a:schemeClr val="tx1"/>
-                </a:solidFill>
-              </a:ln>
-            </p:spPr>
-            <p:style>
-              <a:lnRef idx="2">
-                <a:schemeClr val="accent6"/>
-              </a:lnRef>
-              <a:fillRef idx="1">
-                <a:schemeClr val="lt1"/>
-              </a:fillRef>
-              <a:effectRef idx="0">
-                <a:schemeClr val="accent6"/>
-              </a:effectRef>
-              <a:fontRef idx="minor">
-                <a:schemeClr val="dk1"/>
-              </a:fontRef>
-            </p:style>
-            <p:txBody>
-              <a:bodyPr rtlCol="0" anchor="ctr"/>
-              <a:lstStyle/>
-              <a:p>
-                <a:endParaRPr lang="de-DE"/>
-              </a:p>
-            </p:txBody>
-          </p:sp>
-          <p:sp>
-            <p:nvSpPr>
-              <p:cNvPr id="19" name="Abgerundetes Rechteck 18">
-                <a:extLst>
-                  <a:ext uri="{FF2B5EF4-FFF2-40B4-BE49-F238E27FC236}">
-                    <a16:creationId xmlns:a16="http://schemas.microsoft.com/office/drawing/2014/main" id="{8D08869D-676E-E448-BB29-41720F15C9A1}"/>
-                  </a:ext>
-                </a:extLst>
-              </p:cNvPr>
-              <p:cNvSpPr/>
-              <p:nvPr/>
-            </p:nvSpPr>
-            <p:spPr>
-              <a:xfrm>
-                <a:off x="2678844" y="1429332"/>
-                <a:ext cx="1381931" cy="1464391"/>
-              </a:xfrm>
-              <a:prstGeom prst="roundRect">
-                <a:avLst/>
-              </a:prstGeom>
-              <a:noFill/>
-              <a:ln w="76200">
-                <a:solidFill>
-                  <a:schemeClr val="tx1"/>
-                </a:solidFill>
-              </a:ln>
-            </p:spPr>
-            <p:style>
-              <a:lnRef idx="2">
-                <a:schemeClr val="accent6"/>
-              </a:lnRef>
-              <a:fillRef idx="1">
-                <a:schemeClr val="lt1"/>
-              </a:fillRef>
-              <a:effectRef idx="0">
-                <a:schemeClr val="accent6"/>
-              </a:effectRef>
-              <a:fontRef idx="minor">
-                <a:schemeClr val="dk1"/>
-              </a:fontRef>
-            </p:style>
-            <p:txBody>
-              <a:bodyPr rtlCol="0" anchor="ctr"/>
-              <a:lstStyle/>
-              <a:p>
-                <a:endParaRPr lang="de-DE"/>
-              </a:p>
-            </p:txBody>
-          </p:sp>
-          <p:sp>
-            <p:nvSpPr>
-              <p:cNvPr id="20" name="Abgerundetes Rechteck 19">
-                <a:extLst>
-                  <a:ext uri="{FF2B5EF4-FFF2-40B4-BE49-F238E27FC236}">
-                    <a16:creationId xmlns:a16="http://schemas.microsoft.com/office/drawing/2014/main" id="{F385159A-9674-854B-9CFF-2CE05AFAAB6D}"/>
-                  </a:ext>
-                </a:extLst>
-              </p:cNvPr>
-              <p:cNvSpPr/>
-              <p:nvPr/>
-            </p:nvSpPr>
-            <p:spPr>
-              <a:xfrm>
-                <a:off x="1119973" y="3052577"/>
-                <a:ext cx="1381931" cy="1401613"/>
-              </a:xfrm>
-              <a:prstGeom prst="roundRect">
-                <a:avLst/>
-              </a:prstGeom>
-              <a:noFill/>
-              <a:ln w="76200">
-                <a:solidFill>
-                  <a:schemeClr val="tx1"/>
-                </a:solidFill>
-              </a:ln>
-            </p:spPr>
-            <p:style>
-              <a:lnRef idx="2">
-                <a:schemeClr val="accent6"/>
-              </a:lnRef>
-              <a:fillRef idx="1">
-                <a:schemeClr val="lt1"/>
-              </a:fillRef>
-              <a:effectRef idx="0">
-                <a:schemeClr val="accent6"/>
-              </a:effectRef>
-              <a:fontRef idx="minor">
-                <a:schemeClr val="dk1"/>
-              </a:fontRef>
-            </p:style>
-            <p:txBody>
-              <a:bodyPr rtlCol="0" anchor="ctr"/>
-              <a:lstStyle/>
-              <a:p>
-                <a:endParaRPr lang="de-DE"/>
-              </a:p>
-            </p:txBody>
-          </p:sp>
-          <p:sp>
-            <p:nvSpPr>
-              <p:cNvPr id="21" name="Abgerundetes Rechteck 20">
-                <a:extLst>
-                  <a:ext uri="{FF2B5EF4-FFF2-40B4-BE49-F238E27FC236}">
-                    <a16:creationId xmlns:a16="http://schemas.microsoft.com/office/drawing/2014/main" id="{2759EA4E-4F89-E844-A111-8E4A78C5D56C}"/>
-                  </a:ext>
-                </a:extLst>
-              </p:cNvPr>
-              <p:cNvSpPr/>
-              <p:nvPr/>
-            </p:nvSpPr>
-            <p:spPr>
-              <a:xfrm>
-                <a:off x="2678844" y="3052577"/>
-                <a:ext cx="1381931" cy="1401613"/>
-              </a:xfrm>
-              <a:prstGeom prst="roundRect">
-                <a:avLst/>
-              </a:prstGeom>
-              <a:noFill/>
-              <a:ln w="76200">
-                <a:solidFill>
-                  <a:schemeClr val="tx1"/>
-                </a:solidFill>
-              </a:ln>
-            </p:spPr>
-            <p:style>
-              <a:lnRef idx="2">
-                <a:schemeClr val="accent6"/>
-              </a:lnRef>
-              <a:fillRef idx="1">
-                <a:schemeClr val="lt1"/>
-              </a:fillRef>
-              <a:effectRef idx="0">
-                <a:schemeClr val="accent6"/>
-              </a:effectRef>
-              <a:fontRef idx="minor">
-                <a:schemeClr val="dk1"/>
-              </a:fontRef>
-            </p:style>
-            <p:txBody>
-              <a:bodyPr rtlCol="0" anchor="ctr"/>
-              <a:lstStyle/>
-              <a:p>
-                <a:endParaRPr lang="de-DE" dirty="0"/>
-              </a:p>
-            </p:txBody>
-          </p:sp>
-          <p:pic>
-            <p:nvPicPr>
-              <p:cNvPr id="22" name="Grafik 21" descr="Muskulöser Arm">
-                <a:extLst>
-                  <a:ext uri="{FF2B5EF4-FFF2-40B4-BE49-F238E27FC236}">
-                    <a16:creationId xmlns:a16="http://schemas.microsoft.com/office/drawing/2014/main" id="{37481845-8549-624B-B525-705CC8380AB1}"/>
-                  </a:ext>
-                </a:extLst>
-              </p:cNvPr>
-              <p:cNvPicPr>
-                <a:picLocks noChangeAspect="1"/>
-              </p:cNvPicPr>
-              <p:nvPr/>
-            </p:nvPicPr>
-            <p:blipFill>
-              <a:blip r:embed="rId7">
-                <a:extLst>
-                  <a:ext uri="{96DAC541-7B7A-43D3-8B79-37D633B846F1}">
-                    <asvg:svgBlip xmlns:asvg="http://schemas.microsoft.com/office/drawing/2016/SVG/main" r:embed="rId8"/>
-                  </a:ext>
-                </a:extLst>
-              </a:blip>
-              <a:stretch>
-                <a:fillRect/>
-              </a:stretch>
-            </p:blipFill>
-            <p:spPr>
-              <a:xfrm>
-                <a:off x="2916509" y="1758667"/>
-                <a:ext cx="914400" cy="914400"/>
-              </a:xfrm>
-              <a:prstGeom prst="rect">
-                <a:avLst/>
-              </a:prstGeom>
-            </p:spPr>
-          </p:pic>
-          <p:pic>
-            <p:nvPicPr>
-              <p:cNvPr id="23" name="Grafik 22" descr="Bodybuilder">
-                <a:extLst>
-                  <a:ext uri="{FF2B5EF4-FFF2-40B4-BE49-F238E27FC236}">
-                    <a16:creationId xmlns:a16="http://schemas.microsoft.com/office/drawing/2014/main" id="{92816990-15E4-5C40-85BE-E22CB4DC39F0}"/>
-                  </a:ext>
-                </a:extLst>
-              </p:cNvPr>
-              <p:cNvPicPr>
-                <a:picLocks noChangeAspect="1"/>
-              </p:cNvPicPr>
-              <p:nvPr/>
-            </p:nvPicPr>
-            <p:blipFill>
-              <a:blip r:embed="rId9">
-                <a:extLst>
-                  <a:ext uri="{96DAC541-7B7A-43D3-8B79-37D633B846F1}">
-                    <asvg:svgBlip xmlns:asvg="http://schemas.microsoft.com/office/drawing/2016/SVG/main" r:embed="rId10"/>
-                  </a:ext>
-                </a:extLst>
-              </a:blip>
-              <a:stretch>
-                <a:fillRect/>
-              </a:stretch>
-            </p:blipFill>
-            <p:spPr>
-              <a:xfrm>
-                <a:off x="1353738" y="1785592"/>
-                <a:ext cx="914400" cy="914400"/>
-              </a:xfrm>
-              <a:prstGeom prst="rect">
-                <a:avLst/>
-              </a:prstGeom>
-            </p:spPr>
-          </p:pic>
-          <p:pic>
-            <p:nvPicPr>
-              <p:cNvPr id="24" name="Grafik 23" descr="Hürde">
-                <a:extLst>
-                  <a:ext uri="{FF2B5EF4-FFF2-40B4-BE49-F238E27FC236}">
-                    <a16:creationId xmlns:a16="http://schemas.microsoft.com/office/drawing/2014/main" id="{3000C8CF-A8A5-3B4B-97C6-06EE421C8227}"/>
-                  </a:ext>
-                </a:extLst>
-              </p:cNvPr>
-              <p:cNvPicPr>
-                <a:picLocks noChangeAspect="1"/>
-              </p:cNvPicPr>
-              <p:nvPr/>
-            </p:nvPicPr>
-            <p:blipFill>
-              <a:blip r:embed="rId11">
-                <a:extLst>
-                  <a:ext uri="{96DAC541-7B7A-43D3-8B79-37D633B846F1}">
-                    <asvg:svgBlip xmlns:asvg="http://schemas.microsoft.com/office/drawing/2016/SVG/main" r:embed="rId12"/>
-                  </a:ext>
-                </a:extLst>
-              </a:blip>
-              <a:stretch>
-                <a:fillRect/>
-              </a:stretch>
-            </p:blipFill>
-            <p:spPr>
-              <a:xfrm>
-                <a:off x="1353738" y="3226937"/>
-                <a:ext cx="914400" cy="914400"/>
-              </a:xfrm>
-              <a:prstGeom prst="rect">
-                <a:avLst/>
-              </a:prstGeom>
-            </p:spPr>
-          </p:pic>
-          <p:pic>
-            <p:nvPicPr>
-              <p:cNvPr id="25" name="Grafik 24" descr="Elliptisch">
-                <a:extLst>
-                  <a:ext uri="{FF2B5EF4-FFF2-40B4-BE49-F238E27FC236}">
-                    <a16:creationId xmlns:a16="http://schemas.microsoft.com/office/drawing/2014/main" id="{30DC96F1-E14A-594E-B289-FE6053B4C256}"/>
-                  </a:ext>
-                </a:extLst>
-              </p:cNvPr>
-              <p:cNvPicPr>
-                <a:picLocks noChangeAspect="1"/>
-              </p:cNvPicPr>
-              <p:nvPr/>
-            </p:nvPicPr>
-            <p:blipFill>
-              <a:blip r:embed="rId13">
-                <a:extLst>
-                  <a:ext uri="{96DAC541-7B7A-43D3-8B79-37D633B846F1}">
-                    <asvg:svgBlip xmlns:asvg="http://schemas.microsoft.com/office/drawing/2016/SVG/main" r:embed="rId14"/>
-                  </a:ext>
-                </a:extLst>
-              </a:blip>
-              <a:stretch>
-                <a:fillRect/>
-              </a:stretch>
-            </p:blipFill>
-            <p:spPr>
-              <a:xfrm>
-                <a:off x="2830726" y="3214535"/>
-                <a:ext cx="914400" cy="914400"/>
-              </a:xfrm>
-              <a:prstGeom prst="rect">
-                <a:avLst/>
-              </a:prstGeom>
-            </p:spPr>
-          </p:pic>
-        </p:grpSp>
-        <p:grpSp>
-          <p:nvGrpSpPr>
-            <p:cNvPr id="12" name="Gruppieren 11">
-              <a:extLst>
-                <a:ext uri="{FF2B5EF4-FFF2-40B4-BE49-F238E27FC236}">
-                  <a16:creationId xmlns:a16="http://schemas.microsoft.com/office/drawing/2014/main" id="{43D67448-20CE-5840-AC4E-D1766D4116DC}"/>
-                </a:ext>
-              </a:extLst>
-            </p:cNvPr>
-            <p:cNvGrpSpPr/>
-            <p:nvPr/>
-          </p:nvGrpSpPr>
-          <p:grpSpPr>
-            <a:xfrm>
-              <a:off x="4901652" y="2306525"/>
-              <a:ext cx="2376450" cy="2287932"/>
-              <a:chOff x="4711486" y="1296043"/>
-              <a:chExt cx="2933938" cy="3371626"/>
-            </a:xfrm>
-          </p:grpSpPr>
-          <p:sp>
-            <p:nvSpPr>
-              <p:cNvPr id="16" name="Abgerundetes Rechteck 15">
-                <a:extLst>
-                  <a:ext uri="{FF2B5EF4-FFF2-40B4-BE49-F238E27FC236}">
-                    <a16:creationId xmlns:a16="http://schemas.microsoft.com/office/drawing/2014/main" id="{3ADCE7F0-4FFC-1348-901E-8F4359A868A0}"/>
-                  </a:ext>
-                </a:extLst>
-              </p:cNvPr>
-              <p:cNvSpPr/>
-              <p:nvPr/>
-            </p:nvSpPr>
-            <p:spPr>
-              <a:xfrm>
-                <a:off x="4711486" y="1296043"/>
-                <a:ext cx="2933938" cy="3248833"/>
-              </a:xfrm>
-              <a:prstGeom prst="roundRect">
-                <a:avLst/>
-              </a:prstGeom>
-              <a:noFill/>
-              <a:ln w="76200">
-                <a:solidFill>
-                  <a:schemeClr val="tx1"/>
-                </a:solidFill>
-              </a:ln>
-            </p:spPr>
-            <p:style>
-              <a:lnRef idx="2">
-                <a:schemeClr val="accent6"/>
-              </a:lnRef>
-              <a:fillRef idx="1">
-                <a:schemeClr val="lt1"/>
-              </a:fillRef>
-              <a:effectRef idx="0">
-                <a:schemeClr val="accent6"/>
-              </a:effectRef>
-              <a:fontRef idx="minor">
-                <a:schemeClr val="dk1"/>
-              </a:fontRef>
-            </p:style>
-            <p:txBody>
-              <a:bodyPr rtlCol="0" anchor="ctr"/>
-              <a:lstStyle/>
-              <a:p>
-                <a:endParaRPr lang="de-DE"/>
-              </a:p>
-            </p:txBody>
-          </p:sp>
-          <p:pic>
-            <p:nvPicPr>
-              <p:cNvPr id="17" name="Grafik 16" descr="Änderungen &amp; Schneider">
-                <a:extLst>
-                  <a:ext uri="{FF2B5EF4-FFF2-40B4-BE49-F238E27FC236}">
-                    <a16:creationId xmlns:a16="http://schemas.microsoft.com/office/drawing/2014/main" id="{8BA2BE37-FDC6-0E44-9E97-14BE56340635}"/>
-                  </a:ext>
-                </a:extLst>
-              </p:cNvPr>
-              <p:cNvPicPr>
-                <a:picLocks noChangeAspect="1"/>
-              </p:cNvPicPr>
-              <p:nvPr/>
-            </p:nvPicPr>
-            <p:blipFill>
-              <a:blip r:embed="rId15">
-                <a:extLst>
-                  <a:ext uri="{96DAC541-7B7A-43D3-8B79-37D633B846F1}">
-                    <asvg:svgBlip xmlns:asvg="http://schemas.microsoft.com/office/drawing/2016/SVG/main" r:embed="rId16"/>
-                  </a:ext>
-                </a:extLst>
-              </a:blip>
-              <a:stretch>
-                <a:fillRect/>
-              </a:stretch>
-            </p:blipFill>
-            <p:spPr>
-              <a:xfrm>
-                <a:off x="5160161" y="2631081"/>
-                <a:ext cx="2036588" cy="2036588"/>
-              </a:xfrm>
-              <a:prstGeom prst="rect">
-                <a:avLst/>
-              </a:prstGeom>
-            </p:spPr>
-          </p:pic>
-        </p:grpSp>
-        <p:sp>
-          <p:nvSpPr>
-            <p:cNvPr id="13" name="Abgerundetes Rechteck 12">
-              <a:extLst>
-                <a:ext uri="{FF2B5EF4-FFF2-40B4-BE49-F238E27FC236}">
-                  <a16:creationId xmlns:a16="http://schemas.microsoft.com/office/drawing/2014/main" id="{0CC6499E-85D5-C44F-9E16-BD5B9097FCD7}"/>
-                </a:ext>
-              </a:extLst>
-            </p:cNvPr>
-            <p:cNvSpPr/>
-            <p:nvPr/>
-          </p:nvSpPr>
-          <p:spPr>
-            <a:xfrm>
-              <a:off x="8954503" y="2306524"/>
-              <a:ext cx="2376450" cy="2204607"/>
-            </a:xfrm>
-            <a:prstGeom prst="roundRect">
-              <a:avLst/>
-            </a:prstGeom>
-            <a:noFill/>
-            <a:ln w="76200">
-              <a:solidFill>
-                <a:schemeClr val="tx1"/>
-              </a:solidFill>
-            </a:ln>
-          </p:spPr>
-          <p:style>
-            <a:lnRef idx="2">
-              <a:schemeClr val="accent6"/>
-            </a:lnRef>
-            <a:fillRef idx="1">
-              <a:schemeClr val="lt1"/>
-            </a:fillRef>
-            <a:effectRef idx="0">
-              <a:schemeClr val="accent6"/>
-            </a:effectRef>
-            <a:fontRef idx="minor">
-              <a:schemeClr val="dk1"/>
-            </a:fontRef>
-          </p:style>
-          <p:txBody>
-            <a:bodyPr rtlCol="0" anchor="ctr"/>
-            <a:lstStyle/>
-            <a:p>
-              <a:endParaRPr lang="de-DE"/>
-            </a:p>
-          </p:txBody>
-        </p:sp>
-        <p:pic>
-          <p:nvPicPr>
-            <p:cNvPr id="14" name="Grafik 13" descr="Balkendiagramm">
-              <a:extLst>
-                <a:ext uri="{FF2B5EF4-FFF2-40B4-BE49-F238E27FC236}">
-                  <a16:creationId xmlns:a16="http://schemas.microsoft.com/office/drawing/2014/main" id="{888274BA-26D4-F449-9E91-7B0BF3260EF9}"/>
-                </a:ext>
-              </a:extLst>
-            </p:cNvPr>
-            <p:cNvPicPr>
-              <a:picLocks noChangeAspect="1"/>
-            </p:cNvPicPr>
-            <p:nvPr/>
-          </p:nvPicPr>
-          <p:blipFill>
-            <a:blip r:embed="rId17">
-              <a:extLst>
-                <a:ext uri="{96DAC541-7B7A-43D3-8B79-37D633B846F1}">
-                  <asvg:svgBlip xmlns:asvg="http://schemas.microsoft.com/office/drawing/2016/SVG/main" r:embed="rId18"/>
-                </a:ext>
-              </a:extLst>
-            </a:blip>
-            <a:stretch>
-              <a:fillRect/>
-            </a:stretch>
-          </p:blipFill>
-          <p:spPr>
-            <a:xfrm>
-              <a:off x="8894497" y="2195226"/>
-              <a:ext cx="2517976" cy="2517976"/>
-            </a:xfrm>
-            <a:prstGeom prst="rect">
-              <a:avLst/>
-            </a:prstGeom>
-          </p:spPr>
-        </p:pic>
-        <p:sp>
-          <p:nvSpPr>
-            <p:cNvPr id="15" name="Textfeld 14">
-              <a:extLst>
-                <a:ext uri="{FF2B5EF4-FFF2-40B4-BE49-F238E27FC236}">
-                  <a16:creationId xmlns:a16="http://schemas.microsoft.com/office/drawing/2014/main" id="{FD8337D0-6287-5940-887A-D2B9F12221AA}"/>
-                </a:ext>
-              </a:extLst>
-            </p:cNvPr>
-            <p:cNvSpPr txBox="1"/>
-            <p:nvPr/>
-          </p:nvSpPr>
-          <p:spPr>
-            <a:xfrm>
-              <a:off x="5373976" y="2547679"/>
-              <a:ext cx="1431802" cy="861774"/>
-            </a:xfrm>
-            <a:prstGeom prst="rect">
-              <a:avLst/>
-            </a:prstGeom>
-            <a:noFill/>
-          </p:spPr>
-          <p:txBody>
-            <a:bodyPr wrap="none" rtlCol="0">
-              <a:spAutoFit/>
-            </a:bodyPr>
-            <a:lstStyle/>
-            <a:p>
-              <a:r>
-                <a:rPr lang="de-DE" sz="5000" b="1" dirty="0"/>
-                <a:t>1RM</a:t>
-              </a:r>
-            </a:p>
-          </p:txBody>
-        </p:sp>
-      </p:grpSp>
-    </p:spTree>
-    <p:extLst>
-      <p:ext uri="{BB962C8B-B14F-4D97-AF65-F5344CB8AC3E}">
-        <p14:creationId xmlns:p14="http://schemas.microsoft.com/office/powerpoint/2010/main" val="1261335411"/>
-      </p:ext>
-    </p:extLst>
-  </p:cSld>
-  <p:clrMapOvr>
-    <a:masterClrMapping/>
-  </p:clrMapOvr>
-</p:sld>
-</file>
-
 <file path=ppt/theme/theme1.xml><?xml version="1.0" encoding="utf-8"?>
 <a:theme xmlns:a="http://schemas.openxmlformats.org/drawingml/2006/main" name="Facette">
   <a:themeElements>

</xml_diff>